<commit_message>
update 5 and 6 pptx
</commit_message>
<xml_diff>
--- a/lec/anninbon5.pptx
+++ b/lec/anninbon5.pptx
@@ -5,10 +5,10 @@
     <p:sldMasterId id="2147483706" r:id="rId1"/>
   </p:sldMasterIdLst>
   <p:notesMasterIdLst>
-    <p:notesMasterId r:id="rId27"/>
+    <p:notesMasterId r:id="rId22"/>
   </p:notesMasterIdLst>
   <p:handoutMasterIdLst>
-    <p:handoutMasterId r:id="rId28"/>
+    <p:handoutMasterId r:id="rId23"/>
   </p:handoutMasterIdLst>
   <p:sldIdLst>
     <p:sldId id="552" r:id="rId2"/>
@@ -31,11 +31,6 @@
     <p:sldId id="569" r:id="rId19"/>
     <p:sldId id="570" r:id="rId20"/>
     <p:sldId id="571" r:id="rId21"/>
-    <p:sldId id="572" r:id="rId22"/>
-    <p:sldId id="573" r:id="rId23"/>
-    <p:sldId id="574" r:id="rId24"/>
-    <p:sldId id="575" r:id="rId25"/>
-    <p:sldId id="576" r:id="rId26"/>
   </p:sldIdLst>
   <p:sldSz cx="9144000" cy="6858000" type="screen4x3"/>
   <p:notesSz cx="7099300" cy="10234613"/>
@@ -189,11 +184,6 @@
             <p14:sldId id="569"/>
             <p14:sldId id="570"/>
             <p14:sldId id="571"/>
-            <p14:sldId id="572"/>
-            <p14:sldId id="573"/>
-            <p14:sldId id="574"/>
-            <p14:sldId id="575"/>
-            <p14:sldId id="576"/>
           </p14:sldIdLst>
         </p14:section>
       </p14:sectionLst>
@@ -2375,11 +2365,19 @@
             </a:r>
             <a:r>
               <a:rPr lang="en-US" altLang="ja-JP" sz="2000"/>
-              <a:t>, RSA</a:t>
+              <a:t>, </a:t>
             </a:r>
             <a:r>
               <a:rPr lang="ja-JP" altLang="en-US" sz="2000"/>
-              <a:t>暗号</a:t>
+              <a:t>公開鍵暗号</a:t>
+            </a:r>
+            <a:r>
+              <a:rPr lang="en-US" altLang="ja-JP" sz="2000"/>
+              <a:t>, </a:t>
+            </a:r>
+            <a:r>
+              <a:rPr lang="ja-JP" altLang="en-US" sz="2000"/>
+              <a:t>安全性</a:t>
             </a:r>
             <a:endParaRPr lang="ja-JP" altLang="en-US"/>
           </a:p>
@@ -10694,2639 +10692,6 @@
 </p:sld>
 </file>
 
-<file path=ppt/slides/slide21.xml><?xml version="1.0" encoding="utf-8"?>
-<p:sld xmlns:a="http://schemas.openxmlformats.org/drawingml/2006/main" xmlns:r="http://schemas.openxmlformats.org/officeDocument/2006/relationships" xmlns:p="http://schemas.openxmlformats.org/presentationml/2006/main">
-  <p:cSld>
-    <p:spTree>
-      <p:nvGrpSpPr>
-        <p:cNvPr id="1" name=""/>
-        <p:cNvGrpSpPr/>
-        <p:nvPr/>
-      </p:nvGrpSpPr>
-      <p:grpSpPr>
-        <a:xfrm>
-          <a:off x="0" y="0"/>
-          <a:ext cx="0" cy="0"/>
-          <a:chOff x="0" y="0"/>
-          <a:chExt cx="0" cy="0"/>
-        </a:xfrm>
-      </p:grpSpPr>
-      <mc:AlternateContent xmlns:mc="http://schemas.openxmlformats.org/markup-compatibility/2006" xmlns:a14="http://schemas.microsoft.com/office/drawing/2010/main">
-        <mc:Choice Requires="a14">
-          <p:sp>
-            <p:nvSpPr>
-              <p:cNvPr id="2" name="コンテンツ プレースホルダー 1">
-                <a:extLst>
-                  <a:ext uri="{FF2B5EF4-FFF2-40B4-BE49-F238E27FC236}">
-                    <a16:creationId xmlns:a16="http://schemas.microsoft.com/office/drawing/2014/main" id="{26A2D4CB-C655-42C3-B526-D9B27EAE6448}"/>
-                  </a:ext>
-                </a:extLst>
-              </p:cNvPr>
-              <p:cNvSpPr>
-                <a:spLocks noGrp="1"/>
-              </p:cNvSpPr>
-              <p:nvPr>
-                <p:ph idx="1"/>
-              </p:nvPr>
-            </p:nvSpPr>
-            <p:spPr/>
-            <p:txBody>
-              <a:bodyPr/>
-              <a:lstStyle/>
-              <a:p>
-                <a:r>
-                  <a:rPr kumimoji="1" lang="ja-JP" altLang="en-US"/>
-                  <a:t>小さい</a:t>
-                </a:r>
-                <a:r>
-                  <a:rPr kumimoji="1" lang="en-US" altLang="ja-JP"/>
-                  <a:t>RSA</a:t>
-                </a:r>
-                <a:r>
-                  <a:rPr kumimoji="1" lang="ja-JP" altLang="en-US"/>
-                  <a:t>暗号の例</a:t>
-                </a:r>
-                <a:endParaRPr kumimoji="1" lang="en-US" altLang="ja-JP"/>
-              </a:p>
-              <a:p>
-                <a:pPr lvl="1"/>
-                <a14:m>
-                  <m:oMath xmlns:m="http://schemas.openxmlformats.org/officeDocument/2006/math">
-                    <m:r>
-                      <a:rPr kumimoji="1" lang="en-US" altLang="ja-JP" b="0" i="1" smtClean="0">
-                        <a:latin typeface="Cambria Math" panose="02040503050406030204" pitchFamily="18" charset="0"/>
-                      </a:rPr>
-                      <m:t>𝑛</m:t>
-                    </m:r>
-                    <m:r>
-                      <a:rPr kumimoji="1" lang="en-US" altLang="ja-JP" b="0" i="1" smtClean="0">
-                        <a:latin typeface="Cambria Math" panose="02040503050406030204" pitchFamily="18" charset="0"/>
-                      </a:rPr>
-                      <m:t>=187, </m:t>
-                    </m:r>
-                    <m:r>
-                      <a:rPr kumimoji="1" lang="en-US" altLang="ja-JP" b="0" i="1" smtClean="0">
-                        <a:latin typeface="Cambria Math" panose="02040503050406030204" pitchFamily="18" charset="0"/>
-                      </a:rPr>
-                      <m:t>𝑒</m:t>
-                    </m:r>
-                    <m:r>
-                      <a:rPr kumimoji="1" lang="en-US" altLang="ja-JP" b="0" i="1" smtClean="0">
-                        <a:latin typeface="Cambria Math" panose="02040503050406030204" pitchFamily="18" charset="0"/>
-                      </a:rPr>
-                      <m:t>=3</m:t>
-                    </m:r>
-                  </m:oMath>
-                </a14:m>
-                <a:r>
-                  <a:rPr kumimoji="1" lang="en-US" altLang="ja-JP"/>
-                  <a:t>, </a:t>
-                </a:r>
-                <a14:m>
-                  <m:oMath xmlns:m="http://schemas.openxmlformats.org/officeDocument/2006/math">
-                    <m:r>
-                      <a:rPr kumimoji="1" lang="en-US" altLang="ja-JP" b="0" i="1" smtClean="0">
-                        <a:latin typeface="Cambria Math" panose="02040503050406030204" pitchFamily="18" charset="0"/>
-                      </a:rPr>
-                      <m:t>(</m:t>
-                    </m:r>
-                    <m:r>
-                      <a:rPr kumimoji="1" lang="en-US" altLang="ja-JP" b="0" i="1" smtClean="0">
-                        <a:latin typeface="Cambria Math" panose="02040503050406030204" pitchFamily="18" charset="0"/>
-                      </a:rPr>
-                      <m:t>𝑛</m:t>
-                    </m:r>
-                    <m:r>
-                      <a:rPr kumimoji="1" lang="en-US" altLang="ja-JP" b="0" i="1" smtClean="0">
-                        <a:latin typeface="Cambria Math" panose="02040503050406030204" pitchFamily="18" charset="0"/>
-                      </a:rPr>
-                      <m:t>,</m:t>
-                    </m:r>
-                    <m:r>
-                      <a:rPr kumimoji="1" lang="en-US" altLang="ja-JP" b="0" i="1" smtClean="0">
-                        <a:latin typeface="Cambria Math" panose="02040503050406030204" pitchFamily="18" charset="0"/>
-                      </a:rPr>
-                      <m:t>𝑒</m:t>
-                    </m:r>
-                    <m:r>
-                      <a:rPr kumimoji="1" lang="en-US" altLang="ja-JP" b="0" i="1" smtClean="0">
-                        <a:latin typeface="Cambria Math" panose="02040503050406030204" pitchFamily="18" charset="0"/>
-                      </a:rPr>
-                      <m:t>)</m:t>
-                    </m:r>
-                  </m:oMath>
-                </a14:m>
-                <a:r>
-                  <a:rPr kumimoji="1" lang="ja-JP" altLang="en-US"/>
-                  <a:t>が公開鍵</a:t>
-                </a:r>
-                <a:r>
-                  <a:rPr kumimoji="1" lang="en-US" altLang="ja-JP"/>
-                  <a:t>, </a:t>
-                </a:r>
-                <a14:m>
-                  <m:oMath xmlns:m="http://schemas.openxmlformats.org/officeDocument/2006/math">
-                    <m:r>
-                      <a:rPr kumimoji="1" lang="en-US" altLang="ja-JP" b="0" i="1" smtClean="0">
-                        <a:latin typeface="Cambria Math" panose="02040503050406030204" pitchFamily="18" charset="0"/>
-                      </a:rPr>
-                      <m:t>𝑓</m:t>
-                    </m:r>
-                    <m:d>
-                      <m:dPr>
-                        <m:ctrlPr>
-                          <a:rPr kumimoji="1" lang="en-US" altLang="ja-JP" b="0" i="1" smtClean="0">
-                            <a:latin typeface="Cambria Math" panose="02040503050406030204" pitchFamily="18" charset="0"/>
-                          </a:rPr>
-                        </m:ctrlPr>
-                      </m:dPr>
-                      <m:e>
-                        <m:r>
-                          <a:rPr kumimoji="1" lang="en-US" altLang="ja-JP" b="0" i="1" smtClean="0">
-                            <a:latin typeface="Cambria Math" panose="02040503050406030204" pitchFamily="18" charset="0"/>
-                          </a:rPr>
-                          <m:t>𝑥</m:t>
-                        </m:r>
-                        <m:r>
-                          <a:rPr kumimoji="1" lang="en-US" altLang="ja-JP" b="0" i="1" smtClean="0">
-                            <a:latin typeface="Cambria Math" panose="02040503050406030204" pitchFamily="18" charset="0"/>
-                          </a:rPr>
-                          <m:t>, </m:t>
-                        </m:r>
-                        <m:r>
-                          <a:rPr kumimoji="1" lang="en-US" altLang="ja-JP" b="0" i="1" smtClean="0">
-                            <a:latin typeface="Cambria Math" panose="02040503050406030204" pitchFamily="18" charset="0"/>
-                          </a:rPr>
-                          <m:t>𝑦</m:t>
-                        </m:r>
-                        <m:r>
-                          <a:rPr kumimoji="1" lang="en-US" altLang="ja-JP" b="0" i="1" smtClean="0">
-                            <a:latin typeface="Cambria Math" panose="02040503050406030204" pitchFamily="18" charset="0"/>
-                          </a:rPr>
-                          <m:t>,</m:t>
-                        </m:r>
-                        <m:r>
-                          <a:rPr kumimoji="1" lang="en-US" altLang="ja-JP" b="0" i="1" smtClean="0">
-                            <a:latin typeface="Cambria Math" panose="02040503050406030204" pitchFamily="18" charset="0"/>
-                          </a:rPr>
-                          <m:t>𝑛</m:t>
-                        </m:r>
-                      </m:e>
-                    </m:d>
-                    <m:r>
-                      <a:rPr kumimoji="1" lang="en-US" altLang="ja-JP" b="0" i="1" smtClean="0">
-                        <a:latin typeface="Cambria Math" panose="02040503050406030204" pitchFamily="18" charset="0"/>
-                      </a:rPr>
-                      <m:t>=</m:t>
-                    </m:r>
-                    <m:sSup>
-                      <m:sSupPr>
-                        <m:ctrlPr>
-                          <a:rPr kumimoji="1" lang="en-US" altLang="ja-JP" b="0" i="1" smtClean="0">
-                            <a:latin typeface="Cambria Math" panose="02040503050406030204" pitchFamily="18" charset="0"/>
-                          </a:rPr>
-                        </m:ctrlPr>
-                      </m:sSupPr>
-                      <m:e>
-                        <m:r>
-                          <a:rPr kumimoji="1" lang="en-US" altLang="ja-JP" b="0" i="1" smtClean="0">
-                            <a:latin typeface="Cambria Math" panose="02040503050406030204" pitchFamily="18" charset="0"/>
-                          </a:rPr>
-                          <m:t>𝑥</m:t>
-                        </m:r>
-                      </m:e>
-                      <m:sup>
-                        <m:r>
-                          <a:rPr kumimoji="1" lang="en-US" altLang="ja-JP" b="0" i="1" smtClean="0">
-                            <a:latin typeface="Cambria Math" panose="02040503050406030204" pitchFamily="18" charset="0"/>
-                          </a:rPr>
-                          <m:t>𝑦</m:t>
-                        </m:r>
-                      </m:sup>
-                    </m:sSup>
-                    <m:r>
-                      <a:rPr kumimoji="1" lang="en-US" altLang="ja-JP" b="0" i="1" smtClean="0">
-                        <a:latin typeface="Cambria Math" panose="02040503050406030204" pitchFamily="18" charset="0"/>
-                      </a:rPr>
-                      <m:t> </m:t>
-                    </m:r>
-                    <m:r>
-                      <a:rPr kumimoji="1" lang="en-US" altLang="ja-JP" b="0" i="1" smtClean="0">
-                        <a:latin typeface="Cambria Math" panose="02040503050406030204" pitchFamily="18" charset="0"/>
-                      </a:rPr>
-                      <m:t>𝑚𝑜𝑑</m:t>
-                    </m:r>
-                    <m:r>
-                      <a:rPr kumimoji="1" lang="en-US" altLang="ja-JP" b="0" i="1" smtClean="0">
-                        <a:latin typeface="Cambria Math" panose="02040503050406030204" pitchFamily="18" charset="0"/>
-                      </a:rPr>
-                      <m:t> </m:t>
-                    </m:r>
-                    <m:r>
-                      <a:rPr kumimoji="1" lang="en-US" altLang="ja-JP" b="0" i="1" smtClean="0">
-                        <a:latin typeface="Cambria Math" panose="02040503050406030204" pitchFamily="18" charset="0"/>
-                      </a:rPr>
-                      <m:t>𝑛</m:t>
-                    </m:r>
-                  </m:oMath>
-                </a14:m>
-                <a:endParaRPr kumimoji="1" lang="en-US" altLang="ja-JP"/>
-              </a:p>
-              <a:p>
-                <a:r>
-                  <a:rPr kumimoji="1" lang="ja-JP" altLang="en-US"/>
-                  <a:t>暗号化</a:t>
-                </a:r>
-                <a:endParaRPr kumimoji="1" lang="en-US" altLang="ja-JP"/>
-              </a:p>
-              <a:p>
-                <a:pPr lvl="1"/>
-                <a14:m>
-                  <m:oMath xmlns:m="http://schemas.openxmlformats.org/officeDocument/2006/math">
-                    <m:r>
-                      <a:rPr kumimoji="1" lang="en-US" altLang="ja-JP" b="0" i="1" smtClean="0">
-                        <a:latin typeface="Cambria Math" panose="02040503050406030204" pitchFamily="18" charset="0"/>
-                      </a:rPr>
-                      <m:t>𝐸𝑛𝑐</m:t>
-                    </m:r>
-                    <m:d>
-                      <m:dPr>
-                        <m:ctrlPr>
-                          <a:rPr kumimoji="1" lang="en-US" altLang="ja-JP" b="0" i="1" smtClean="0">
-                            <a:latin typeface="Cambria Math" panose="02040503050406030204" pitchFamily="18" charset="0"/>
-                          </a:rPr>
-                        </m:ctrlPr>
-                      </m:dPr>
-                      <m:e>
-                        <m:r>
-                          <a:rPr kumimoji="1" lang="en-US" altLang="ja-JP" b="0" i="1" smtClean="0">
-                            <a:latin typeface="Cambria Math" panose="02040503050406030204" pitchFamily="18" charset="0"/>
-                          </a:rPr>
-                          <m:t>𝑚</m:t>
-                        </m:r>
-                      </m:e>
-                    </m:d>
-                    <m:r>
-                      <a:rPr kumimoji="1" lang="en-US" altLang="ja-JP" b="0" i="1" smtClean="0">
-                        <a:latin typeface="Cambria Math" panose="02040503050406030204" pitchFamily="18" charset="0"/>
-                      </a:rPr>
-                      <m:t>=</m:t>
-                    </m:r>
-                    <m:sSup>
-                      <m:sSupPr>
-                        <m:ctrlPr>
-                          <a:rPr kumimoji="1" lang="en-US" altLang="ja-JP" b="0" i="1" smtClean="0">
-                            <a:latin typeface="Cambria Math" panose="02040503050406030204" pitchFamily="18" charset="0"/>
-                          </a:rPr>
-                        </m:ctrlPr>
-                      </m:sSupPr>
-                      <m:e>
-                        <m:r>
-                          <a:rPr kumimoji="1" lang="en-US" altLang="ja-JP" b="0" i="1" smtClean="0">
-                            <a:latin typeface="Cambria Math" panose="02040503050406030204" pitchFamily="18" charset="0"/>
-                          </a:rPr>
-                          <m:t>𝑚</m:t>
-                        </m:r>
-                      </m:e>
-                      <m:sup>
-                        <m:r>
-                          <a:rPr kumimoji="1" lang="en-US" altLang="ja-JP" b="0" i="1" smtClean="0">
-                            <a:latin typeface="Cambria Math" panose="02040503050406030204" pitchFamily="18" charset="0"/>
-                          </a:rPr>
-                          <m:t>𝑒</m:t>
-                        </m:r>
-                      </m:sup>
-                    </m:sSup>
-                    <m:r>
-                      <a:rPr kumimoji="1" lang="en-US" altLang="ja-JP" b="0" i="0" smtClean="0">
-                        <a:latin typeface="Cambria Math" panose="02040503050406030204" pitchFamily="18" charset="0"/>
-                      </a:rPr>
-                      <m:t> </m:t>
-                    </m:r>
-                    <m:r>
-                      <m:rPr>
-                        <m:sty m:val="p"/>
-                      </m:rPr>
-                      <a:rPr kumimoji="1" lang="en-US" altLang="ja-JP" b="0" i="0" smtClean="0">
-                        <a:latin typeface="Cambria Math" panose="02040503050406030204" pitchFamily="18" charset="0"/>
-                      </a:rPr>
-                      <m:t>mod</m:t>
-                    </m:r>
-                    <m:r>
-                      <a:rPr kumimoji="1" lang="en-US" altLang="ja-JP" b="0" i="0" smtClean="0">
-                        <a:latin typeface="Cambria Math" panose="02040503050406030204" pitchFamily="18" charset="0"/>
-                      </a:rPr>
-                      <m:t> </m:t>
-                    </m:r>
-                    <m:r>
-                      <a:rPr kumimoji="1" lang="en-US" altLang="ja-JP" b="0" i="1" smtClean="0">
-                        <a:latin typeface="Cambria Math" panose="02040503050406030204" pitchFamily="18" charset="0"/>
-                      </a:rPr>
-                      <m:t>𝑛</m:t>
-                    </m:r>
-                  </m:oMath>
-                </a14:m>
-                <a:endParaRPr kumimoji="1" lang="en-US" altLang="ja-JP" i="1"/>
-              </a:p>
-              <a:p>
-                <a:pPr lvl="1"/>
-                <a:endParaRPr lang="en-US" altLang="ja-JP" i="1"/>
-              </a:p>
-              <a:p>
-                <a:pPr lvl="1"/>
-                <a:endParaRPr kumimoji="1" lang="en-US" altLang="ja-JP" i="1"/>
-              </a:p>
-              <a:p>
-                <a:pPr lvl="1"/>
-                <a:endParaRPr lang="en-US" altLang="ja-JP" i="1"/>
-              </a:p>
-              <a:p>
-                <a:r>
-                  <a:rPr kumimoji="1" lang="ja-JP" altLang="en-US"/>
-                  <a:t>復号</a:t>
-                </a:r>
-                <a:endParaRPr kumimoji="1" lang="en-US" altLang="ja-JP"/>
-              </a:p>
-              <a:p>
-                <a:pPr lvl="1"/>
-                <a14:m>
-                  <m:oMath xmlns:m="http://schemas.openxmlformats.org/officeDocument/2006/math">
-                    <m:r>
-                      <a:rPr kumimoji="1" lang="en-US" altLang="ja-JP" b="0" i="1" smtClean="0">
-                        <a:latin typeface="Cambria Math" panose="02040503050406030204" pitchFamily="18" charset="0"/>
-                      </a:rPr>
-                      <m:t>𝐷𝑒𝑐</m:t>
-                    </m:r>
-                    <m:d>
-                      <m:dPr>
-                        <m:ctrlPr>
-                          <a:rPr kumimoji="1" lang="en-US" altLang="ja-JP" b="0" i="1" smtClean="0">
-                            <a:latin typeface="Cambria Math" panose="02040503050406030204" pitchFamily="18" charset="0"/>
-                          </a:rPr>
-                        </m:ctrlPr>
-                      </m:dPr>
-                      <m:e>
-                        <m:r>
-                          <a:rPr kumimoji="1" lang="en-US" altLang="ja-JP" b="0" i="1" smtClean="0">
-                            <a:latin typeface="Cambria Math" panose="02040503050406030204" pitchFamily="18" charset="0"/>
-                          </a:rPr>
-                          <m:t>𝑐</m:t>
-                        </m:r>
-                      </m:e>
-                    </m:d>
-                    <m:r>
-                      <a:rPr kumimoji="1" lang="en-US" altLang="ja-JP" b="0" i="1" smtClean="0">
-                        <a:latin typeface="Cambria Math" panose="02040503050406030204" pitchFamily="18" charset="0"/>
-                      </a:rPr>
-                      <m:t>=</m:t>
-                    </m:r>
-                    <m:sSup>
-                      <m:sSupPr>
-                        <m:ctrlPr>
-                          <a:rPr kumimoji="1" lang="en-US" altLang="ja-JP" b="0" i="1" smtClean="0">
-                            <a:latin typeface="Cambria Math" panose="02040503050406030204" pitchFamily="18" charset="0"/>
-                          </a:rPr>
-                        </m:ctrlPr>
-                      </m:sSupPr>
-                      <m:e>
-                        <m:r>
-                          <a:rPr kumimoji="1" lang="en-US" altLang="ja-JP" b="0" i="1" smtClean="0">
-                            <a:latin typeface="Cambria Math" panose="02040503050406030204" pitchFamily="18" charset="0"/>
-                          </a:rPr>
-                          <m:t>𝑐</m:t>
-                        </m:r>
-                      </m:e>
-                      <m:sup>
-                        <m:r>
-                          <a:rPr kumimoji="1" lang="en-US" altLang="ja-JP" b="0" i="1" smtClean="0">
-                            <a:latin typeface="Cambria Math" panose="02040503050406030204" pitchFamily="18" charset="0"/>
-                          </a:rPr>
-                          <m:t>𝑑</m:t>
-                        </m:r>
-                      </m:sup>
-                    </m:sSup>
-                    <m:r>
-                      <a:rPr kumimoji="1" lang="en-US" altLang="ja-JP" b="0" i="1" smtClean="0">
-                        <a:latin typeface="Cambria Math" panose="02040503050406030204" pitchFamily="18" charset="0"/>
-                      </a:rPr>
-                      <m:t> </m:t>
-                    </m:r>
-                    <m:r>
-                      <m:rPr>
-                        <m:sty m:val="p"/>
-                      </m:rPr>
-                      <a:rPr kumimoji="1" lang="en-US" altLang="ja-JP" b="0" i="1" smtClean="0">
-                        <a:latin typeface="Cambria Math" panose="02040503050406030204" pitchFamily="18" charset="0"/>
-                      </a:rPr>
-                      <m:t>mod</m:t>
-                    </m:r>
-                    <m:r>
-                      <a:rPr kumimoji="1" lang="en-US" altLang="ja-JP" b="0" i="1" smtClean="0">
-                        <a:latin typeface="Cambria Math" panose="02040503050406030204" pitchFamily="18" charset="0"/>
-                      </a:rPr>
-                      <m:t> </m:t>
-                    </m:r>
-                    <m:r>
-                      <a:rPr kumimoji="1" lang="en-US" altLang="ja-JP" b="0" i="1" smtClean="0">
-                        <a:latin typeface="Cambria Math" panose="02040503050406030204" pitchFamily="18" charset="0"/>
-                      </a:rPr>
-                      <m:t>𝑛</m:t>
-                    </m:r>
-                  </m:oMath>
-                </a14:m>
-                <a:r>
-                  <a:rPr kumimoji="1" lang="ja-JP" altLang="en-US"/>
-                  <a:t> </a:t>
-                </a:r>
-                <a:r>
-                  <a:rPr kumimoji="1" lang="en-US" altLang="ja-JP"/>
-                  <a:t>where </a:t>
-                </a:r>
-                <a14:m>
-                  <m:oMath xmlns:m="http://schemas.openxmlformats.org/officeDocument/2006/math">
-                    <m:r>
-                      <a:rPr kumimoji="1" lang="en-US" altLang="ja-JP" b="0" i="1" smtClean="0">
-                        <a:latin typeface="Cambria Math" panose="02040503050406030204" pitchFamily="18" charset="0"/>
-                      </a:rPr>
-                      <m:t>𝑑</m:t>
-                    </m:r>
-                    <m:r>
-                      <a:rPr kumimoji="1" lang="en-US" altLang="ja-JP" b="0" i="1" smtClean="0">
-                        <a:latin typeface="Cambria Math" panose="02040503050406030204" pitchFamily="18" charset="0"/>
-                      </a:rPr>
-                      <m:t>=107</m:t>
-                    </m:r>
-                  </m:oMath>
-                </a14:m>
-                <a:endParaRPr kumimoji="1" lang="ja-JP" altLang="en-US"/>
-              </a:p>
-            </p:txBody>
-          </p:sp>
-        </mc:Choice>
-        <mc:Fallback xmlns="">
-          <p:sp>
-            <p:nvSpPr>
-              <p:cNvPr id="2" name="コンテンツ プレースホルダー 1">
-                <a:extLst>
-                  <a:ext uri="{FF2B5EF4-FFF2-40B4-BE49-F238E27FC236}">
-                    <a16:creationId xmlns:a16="http://schemas.microsoft.com/office/drawing/2014/main" id="{26A2D4CB-C655-42C3-B526-D9B27EAE6448}"/>
-                  </a:ext>
-                </a:extLst>
-              </p:cNvPr>
-              <p:cNvSpPr>
-                <a:spLocks noGrp="1" noRot="1" noChangeAspect="1" noMove="1" noResize="1" noEditPoints="1" noAdjustHandles="1" noChangeArrowheads="1" noChangeShapeType="1" noTextEdit="1"/>
-              </p:cNvSpPr>
-              <p:nvPr>
-                <p:ph idx="1"/>
-              </p:nvPr>
-            </p:nvSpPr>
-            <p:spPr>
-              <a:blipFill>
-                <a:blip r:embed="rId2"/>
-                <a:stretch>
-                  <a:fillRect l="-1200" t="-1454"/>
-                </a:stretch>
-              </a:blipFill>
-            </p:spPr>
-            <p:txBody>
-              <a:bodyPr/>
-              <a:lstStyle/>
-              <a:p>
-                <a:r>
-                  <a:rPr lang="ja-JP" altLang="en-US">
-                    <a:noFill/>
-                  </a:rPr>
-                  <a:t> </a:t>
-                </a:r>
-              </a:p>
-            </p:txBody>
-          </p:sp>
-        </mc:Fallback>
-      </mc:AlternateContent>
-      <p:sp>
-        <p:nvSpPr>
-          <p:cNvPr id="3" name="スライド番号プレースホルダー 2">
-            <a:extLst>
-              <a:ext uri="{FF2B5EF4-FFF2-40B4-BE49-F238E27FC236}">
-                <a16:creationId xmlns:a16="http://schemas.microsoft.com/office/drawing/2014/main" id="{8D526329-3EE1-485C-ABB1-A42ECF6A257B}"/>
-              </a:ext>
-            </a:extLst>
-          </p:cNvPr>
-          <p:cNvSpPr>
-            <a:spLocks noGrp="1"/>
-          </p:cNvSpPr>
-          <p:nvPr>
-            <p:ph type="sldNum" sz="quarter" idx="12"/>
-          </p:nvPr>
-        </p:nvSpPr>
-        <p:spPr/>
-        <p:txBody>
-          <a:bodyPr/>
-          <a:lstStyle/>
-          <a:p>
-            <a:pPr>
-              <a:defRPr/>
-            </a:pPr>
-            <a:r>
-              <a:rPr lang="en-US" altLang="ja-JP"/>
-              <a:t>    </a:t>
-            </a:r>
-            <a:fld id="{B2782DEB-472A-4FE5-AC34-C17109CF5A91}" type="slidenum">
-              <a:rPr lang="en-US" altLang="ja-JP" smtClean="0"/>
-              <a:pPr>
-                <a:defRPr/>
-              </a:pPr>
-              <a:t>21</a:t>
-            </a:fld>
-            <a:r>
-              <a:rPr lang="en-US" altLang="ja-JP"/>
-              <a:t> / 24</a:t>
-            </a:r>
-          </a:p>
-        </p:txBody>
-      </p:sp>
-      <p:sp>
-        <p:nvSpPr>
-          <p:cNvPr id="4" name="タイトル 3">
-            <a:extLst>
-              <a:ext uri="{FF2B5EF4-FFF2-40B4-BE49-F238E27FC236}">
-                <a16:creationId xmlns:a16="http://schemas.microsoft.com/office/drawing/2014/main" id="{875EFD97-F8C3-4C9F-980C-B776C7D4AB59}"/>
-              </a:ext>
-            </a:extLst>
-          </p:cNvPr>
-          <p:cNvSpPr>
-            <a:spLocks noGrp="1"/>
-          </p:cNvSpPr>
-          <p:nvPr>
-            <p:ph type="title"/>
-          </p:nvPr>
-        </p:nvSpPr>
-        <p:spPr/>
-        <p:txBody>
-          <a:bodyPr/>
-          <a:lstStyle/>
-          <a:p>
-            <a:r>
-              <a:rPr kumimoji="1" lang="en-US" altLang="ja-JP"/>
-              <a:t>RSA</a:t>
-            </a:r>
-            <a:r>
-              <a:rPr kumimoji="1" lang="ja-JP" altLang="en-US"/>
-              <a:t>暗号</a:t>
-            </a:r>
-          </a:p>
-        </p:txBody>
-      </p:sp>
-      <p:pic>
-        <p:nvPicPr>
-          <p:cNvPr id="9" name="図 8">
-            <a:extLst>
-              <a:ext uri="{FF2B5EF4-FFF2-40B4-BE49-F238E27FC236}">
-                <a16:creationId xmlns:a16="http://schemas.microsoft.com/office/drawing/2014/main" id="{3D584A73-DD77-4350-B1BA-14D40EC0D2BE}"/>
-              </a:ext>
-            </a:extLst>
-          </p:cNvPr>
-          <p:cNvPicPr>
-            <a:picLocks noChangeAspect="1"/>
-          </p:cNvPicPr>
-          <p:nvPr/>
-        </p:nvPicPr>
-        <p:blipFill>
-          <a:blip r:embed="rId3"/>
-          <a:stretch>
-            <a:fillRect/>
-          </a:stretch>
-        </p:blipFill>
-        <p:spPr>
-          <a:xfrm>
-            <a:off x="179512" y="2780928"/>
-            <a:ext cx="8630854" cy="1009791"/>
-          </a:xfrm>
-          <a:prstGeom prst="rect">
-            <a:avLst/>
-          </a:prstGeom>
-        </p:spPr>
-      </p:pic>
-      <p:pic>
-        <p:nvPicPr>
-          <p:cNvPr id="11" name="図 10">
-            <a:extLst>
-              <a:ext uri="{FF2B5EF4-FFF2-40B4-BE49-F238E27FC236}">
-                <a16:creationId xmlns:a16="http://schemas.microsoft.com/office/drawing/2014/main" id="{1A6CE484-9A3C-4225-9CB7-96C0836BADDB}"/>
-              </a:ext>
-            </a:extLst>
-          </p:cNvPr>
-          <p:cNvPicPr>
-            <a:picLocks noChangeAspect="1"/>
-          </p:cNvPicPr>
-          <p:nvPr/>
-        </p:nvPicPr>
-        <p:blipFill>
-          <a:blip r:embed="rId4"/>
-          <a:stretch>
-            <a:fillRect/>
-          </a:stretch>
-        </p:blipFill>
-        <p:spPr>
-          <a:xfrm>
-            <a:off x="179512" y="5301208"/>
-            <a:ext cx="8688012" cy="847843"/>
-          </a:xfrm>
-          <a:prstGeom prst="rect">
-            <a:avLst/>
-          </a:prstGeom>
-        </p:spPr>
-      </p:pic>
-    </p:spTree>
-    <p:extLst>
-      <p:ext uri="{BB962C8B-B14F-4D97-AF65-F5344CB8AC3E}">
-        <p14:creationId xmlns:p14="http://schemas.microsoft.com/office/powerpoint/2010/main" val="3246770108"/>
-      </p:ext>
-    </p:extLst>
-  </p:cSld>
-  <p:clrMapOvr>
-    <a:masterClrMapping/>
-  </p:clrMapOvr>
-</p:sld>
-</file>
-
-<file path=ppt/slides/slide22.xml><?xml version="1.0" encoding="utf-8"?>
-<p:sld xmlns:a="http://schemas.openxmlformats.org/drawingml/2006/main" xmlns:r="http://schemas.openxmlformats.org/officeDocument/2006/relationships" xmlns:p="http://schemas.openxmlformats.org/presentationml/2006/main">
-  <p:cSld>
-    <p:spTree>
-      <p:nvGrpSpPr>
-        <p:cNvPr id="1" name=""/>
-        <p:cNvGrpSpPr/>
-        <p:nvPr/>
-      </p:nvGrpSpPr>
-      <p:grpSpPr>
-        <a:xfrm>
-          <a:off x="0" y="0"/>
-          <a:ext cx="0" cy="0"/>
-          <a:chOff x="0" y="0"/>
-          <a:chExt cx="0" cy="0"/>
-        </a:xfrm>
-      </p:grpSpPr>
-      <mc:AlternateContent xmlns:mc="http://schemas.openxmlformats.org/markup-compatibility/2006" xmlns:a14="http://schemas.microsoft.com/office/drawing/2010/main">
-        <mc:Choice Requires="a14">
-          <p:sp>
-            <p:nvSpPr>
-              <p:cNvPr id="2" name="コンテンツ プレースホルダー 1">
-                <a:extLst>
-                  <a:ext uri="{FF2B5EF4-FFF2-40B4-BE49-F238E27FC236}">
-                    <a16:creationId xmlns:a16="http://schemas.microsoft.com/office/drawing/2014/main" id="{FF3CD97D-46FD-45F6-A46D-44F67556EBFB}"/>
-                  </a:ext>
-                </a:extLst>
-              </p:cNvPr>
-              <p:cNvSpPr>
-                <a:spLocks noGrp="1"/>
-              </p:cNvSpPr>
-              <p:nvPr>
-                <p:ph idx="1"/>
-              </p:nvPr>
-            </p:nvSpPr>
-            <p:spPr/>
-            <p:txBody>
-              <a:bodyPr/>
-              <a:lstStyle/>
-              <a:p>
-                <a:r>
-                  <a:rPr kumimoji="1" lang="ja-JP" altLang="en-US"/>
-                  <a:t>鍵生成</a:t>
-                </a:r>
-                <a:endParaRPr kumimoji="1" lang="en-US" altLang="ja-JP"/>
-              </a:p>
-              <a:p>
-                <a:pPr lvl="1"/>
-                <a:r>
-                  <a:rPr kumimoji="1" lang="en-US" altLang="ja-JP"/>
-                  <a:t>2</a:t>
-                </a:r>
-                <a:r>
-                  <a:rPr kumimoji="1" lang="ja-JP" altLang="en-US"/>
-                  <a:t>個の素数</a:t>
-                </a:r>
-                <a14:m>
-                  <m:oMath xmlns:m="http://schemas.openxmlformats.org/officeDocument/2006/math">
-                    <m:r>
-                      <a:rPr kumimoji="1" lang="en-US" altLang="ja-JP" b="0" i="1" smtClean="0">
-                        <a:latin typeface="Cambria Math" panose="02040503050406030204" pitchFamily="18" charset="0"/>
-                      </a:rPr>
-                      <m:t>𝑝</m:t>
-                    </m:r>
-                  </m:oMath>
-                </a14:m>
-                <a:r>
-                  <a:rPr kumimoji="1" lang="ja-JP" altLang="en-US"/>
-                  <a:t>と</a:t>
-                </a:r>
-                <a14:m>
-                  <m:oMath xmlns:m="http://schemas.openxmlformats.org/officeDocument/2006/math">
-                    <m:r>
-                      <a:rPr kumimoji="1" lang="en-US" altLang="ja-JP" b="0" i="1" smtClean="0">
-                        <a:latin typeface="Cambria Math" panose="02040503050406030204" pitchFamily="18" charset="0"/>
-                      </a:rPr>
-                      <m:t>𝑞</m:t>
-                    </m:r>
-                  </m:oMath>
-                </a14:m>
-                <a:r>
-                  <a:rPr kumimoji="1" lang="ja-JP" altLang="en-US"/>
-                  <a:t>を選び</a:t>
-                </a:r>
-                <a14:m>
-                  <m:oMath xmlns:m="http://schemas.openxmlformats.org/officeDocument/2006/math">
-                    <m:r>
-                      <a:rPr kumimoji="1" lang="en-US" altLang="ja-JP" b="0" i="1" smtClean="0">
-                        <a:latin typeface="Cambria Math" panose="02040503050406030204" pitchFamily="18" charset="0"/>
-                      </a:rPr>
-                      <m:t>𝑛</m:t>
-                    </m:r>
-                    <m:r>
-                      <a:rPr kumimoji="1" lang="en-US" altLang="ja-JP" b="0" i="1" smtClean="0">
-                        <a:latin typeface="Cambria Math" panose="02040503050406030204" pitchFamily="18" charset="0"/>
-                      </a:rPr>
-                      <m:t>=</m:t>
-                    </m:r>
-                    <m:r>
-                      <a:rPr kumimoji="1" lang="en-US" altLang="ja-JP" b="0" i="1" smtClean="0">
-                        <a:latin typeface="Cambria Math" panose="02040503050406030204" pitchFamily="18" charset="0"/>
-                      </a:rPr>
-                      <m:t>𝑝𝑞</m:t>
-                    </m:r>
-                  </m:oMath>
-                </a14:m>
-                <a:r>
-                  <a:rPr kumimoji="1" lang="ja-JP" altLang="en-US"/>
-                  <a:t>とする</a:t>
-                </a:r>
-                <a:endParaRPr kumimoji="1" lang="en-US" altLang="ja-JP"/>
-              </a:p>
-              <a:p>
-                <a:pPr lvl="1"/>
-                <a14:m>
-                  <m:oMath xmlns:m="http://schemas.openxmlformats.org/officeDocument/2006/math">
-                    <m:r>
-                      <a:rPr kumimoji="1" lang="en-US" altLang="ja-JP" b="0" i="1" smtClean="0">
-                        <a:latin typeface="Cambria Math" panose="02040503050406030204" pitchFamily="18" charset="0"/>
-                      </a:rPr>
-                      <m:t>𝑒</m:t>
-                    </m:r>
-                  </m:oMath>
-                </a14:m>
-                <a:r>
-                  <a:rPr kumimoji="1" lang="ja-JP" altLang="en-US"/>
-                  <a:t>を選ぶ</a:t>
-                </a:r>
-                <a:r>
-                  <a:rPr kumimoji="1" lang="en-US" altLang="ja-JP"/>
-                  <a:t>(e.g., </a:t>
-                </a:r>
-                <a14:m>
-                  <m:oMath xmlns:m="http://schemas.openxmlformats.org/officeDocument/2006/math">
-                    <m:r>
-                      <a:rPr kumimoji="1" lang="en-US" altLang="ja-JP" b="0" i="1" smtClean="0">
-                        <a:latin typeface="Cambria Math" panose="02040503050406030204" pitchFamily="18" charset="0"/>
-                      </a:rPr>
-                      <m:t>𝑒</m:t>
-                    </m:r>
-                    <m:r>
-                      <a:rPr kumimoji="1" lang="en-US" altLang="ja-JP" b="0" i="1" smtClean="0">
-                        <a:latin typeface="Cambria Math" panose="02040503050406030204" pitchFamily="18" charset="0"/>
-                      </a:rPr>
-                      <m:t>=65537</m:t>
-                    </m:r>
-                  </m:oMath>
-                </a14:m>
-                <a:r>
-                  <a:rPr kumimoji="1" lang="en-US" altLang="ja-JP"/>
-                  <a:t>)</a:t>
-                </a:r>
-              </a:p>
-              <a:p>
-                <a:pPr lvl="1"/>
-                <a14:m>
-                  <m:oMath xmlns:m="http://schemas.openxmlformats.org/officeDocument/2006/math">
-                    <m:r>
-                      <a:rPr kumimoji="1" lang="en-US" altLang="ja-JP" b="0" i="1" smtClean="0">
-                        <a:latin typeface="Cambria Math" panose="02040503050406030204" pitchFamily="18" charset="0"/>
-                      </a:rPr>
-                      <m:t>𝑒𝑑</m:t>
-                    </m:r>
-                  </m:oMath>
-                </a14:m>
-                <a:r>
-                  <a:rPr kumimoji="1" lang="ja-JP" altLang="en-US"/>
-                  <a:t>を</a:t>
-                </a:r>
-                <a14:m>
-                  <m:oMath xmlns:m="http://schemas.openxmlformats.org/officeDocument/2006/math">
-                    <m:r>
-                      <a:rPr kumimoji="1" lang="en-US" altLang="ja-JP" b="0" i="1" smtClean="0">
-                        <a:latin typeface="Cambria Math" panose="02040503050406030204" pitchFamily="18" charset="0"/>
-                      </a:rPr>
-                      <m:t>(</m:t>
-                    </m:r>
-                    <m:r>
-                      <a:rPr kumimoji="1" lang="en-US" altLang="ja-JP" b="0" i="1" smtClean="0">
-                        <a:latin typeface="Cambria Math" panose="02040503050406030204" pitchFamily="18" charset="0"/>
-                      </a:rPr>
-                      <m:t>𝑝</m:t>
-                    </m:r>
-                    <m:r>
-                      <a:rPr kumimoji="1" lang="en-US" altLang="ja-JP" b="0" i="1" smtClean="0">
-                        <a:latin typeface="Cambria Math" panose="02040503050406030204" pitchFamily="18" charset="0"/>
-                      </a:rPr>
-                      <m:t>−1)(</m:t>
-                    </m:r>
-                    <m:r>
-                      <a:rPr kumimoji="1" lang="en-US" altLang="ja-JP" b="0" i="1" smtClean="0">
-                        <a:latin typeface="Cambria Math" panose="02040503050406030204" pitchFamily="18" charset="0"/>
-                      </a:rPr>
-                      <m:t>𝑞</m:t>
-                    </m:r>
-                    <m:r>
-                      <a:rPr kumimoji="1" lang="en-US" altLang="ja-JP" b="0" i="1" smtClean="0">
-                        <a:latin typeface="Cambria Math" panose="02040503050406030204" pitchFamily="18" charset="0"/>
-                      </a:rPr>
-                      <m:t>−1)</m:t>
-                    </m:r>
-                  </m:oMath>
-                </a14:m>
-                <a:r>
-                  <a:rPr kumimoji="1" lang="ja-JP" altLang="en-US"/>
-                  <a:t>で割った余りが</a:t>
-                </a:r>
-                <a:r>
-                  <a:rPr kumimoji="1" lang="en-US" altLang="ja-JP"/>
-                  <a:t>1</a:t>
-                </a:r>
-                <a:r>
-                  <a:rPr kumimoji="1" lang="ja-JP" altLang="en-US"/>
-                  <a:t>となる</a:t>
-                </a:r>
-                <a14:m>
-                  <m:oMath xmlns:m="http://schemas.openxmlformats.org/officeDocument/2006/math">
-                    <m:r>
-                      <a:rPr kumimoji="1" lang="en-US" altLang="ja-JP" b="0" i="1" smtClean="0">
-                        <a:latin typeface="Cambria Math" panose="02040503050406030204" pitchFamily="18" charset="0"/>
-                      </a:rPr>
-                      <m:t>𝑑</m:t>
-                    </m:r>
-                  </m:oMath>
-                </a14:m>
-                <a:r>
-                  <a:rPr kumimoji="1" lang="ja-JP" altLang="en-US"/>
-                  <a:t>を探す</a:t>
-                </a:r>
-                <a:endParaRPr kumimoji="1" lang="en-US" altLang="ja-JP"/>
-              </a:p>
-              <a:p>
-                <a:pPr lvl="2"/>
-                <a:r>
-                  <a:rPr kumimoji="1" lang="ja-JP" altLang="en-US"/>
-                  <a:t>先程の例 </a:t>
-                </a:r>
-                <a:r>
-                  <a:rPr kumimoji="1" lang="en-US" altLang="ja-JP"/>
-                  <a:t>: </a:t>
-                </a:r>
-                <a14:m>
-                  <m:oMath xmlns:m="http://schemas.openxmlformats.org/officeDocument/2006/math">
-                    <m:r>
-                      <a:rPr kumimoji="1" lang="en-US" altLang="ja-JP" b="0" i="1" smtClean="0">
-                        <a:latin typeface="Cambria Math" panose="02040503050406030204" pitchFamily="18" charset="0"/>
-                      </a:rPr>
-                      <m:t>𝑝</m:t>
-                    </m:r>
-                    <m:r>
-                      <a:rPr kumimoji="1" lang="en-US" altLang="ja-JP" b="0" i="1" smtClean="0">
-                        <a:latin typeface="Cambria Math" panose="02040503050406030204" pitchFamily="18" charset="0"/>
-                      </a:rPr>
-                      <m:t>=11, </m:t>
-                    </m:r>
-                    <m:r>
-                      <a:rPr kumimoji="1" lang="en-US" altLang="ja-JP" b="0" i="1" smtClean="0">
-                        <a:latin typeface="Cambria Math" panose="02040503050406030204" pitchFamily="18" charset="0"/>
-                      </a:rPr>
-                      <m:t>𝑞</m:t>
-                    </m:r>
-                    <m:r>
-                      <a:rPr kumimoji="1" lang="en-US" altLang="ja-JP" b="0" i="1" smtClean="0">
-                        <a:latin typeface="Cambria Math" panose="02040503050406030204" pitchFamily="18" charset="0"/>
-                      </a:rPr>
-                      <m:t>=17, </m:t>
-                    </m:r>
-                    <m:r>
-                      <a:rPr kumimoji="1" lang="en-US" altLang="ja-JP" b="0" i="1" smtClean="0">
-                        <a:latin typeface="Cambria Math" panose="02040503050406030204" pitchFamily="18" charset="0"/>
-                      </a:rPr>
-                      <m:t>𝑛</m:t>
-                    </m:r>
-                    <m:r>
-                      <a:rPr kumimoji="1" lang="en-US" altLang="ja-JP" b="0" i="1" smtClean="0">
-                        <a:latin typeface="Cambria Math" panose="02040503050406030204" pitchFamily="18" charset="0"/>
-                      </a:rPr>
-                      <m:t>=187,</m:t>
-                    </m:r>
-                    <m:r>
-                      <a:rPr lang="en-US" altLang="ja-JP" i="1">
-                        <a:latin typeface="Cambria Math" panose="02040503050406030204" pitchFamily="18" charset="0"/>
-                      </a:rPr>
-                      <m:t>𝑒</m:t>
-                    </m:r>
-                    <m:r>
-                      <a:rPr lang="en-US" altLang="ja-JP" i="1">
-                        <a:latin typeface="Cambria Math" panose="02040503050406030204" pitchFamily="18" charset="0"/>
-                      </a:rPr>
-                      <m:t>=3, </m:t>
-                    </m:r>
-                    <m:r>
-                      <a:rPr lang="en-US" altLang="ja-JP" i="1">
-                        <a:latin typeface="Cambria Math" panose="02040503050406030204" pitchFamily="18" charset="0"/>
-                      </a:rPr>
-                      <m:t>𝑑</m:t>
-                    </m:r>
-                    <m:r>
-                      <a:rPr lang="en-US" altLang="ja-JP" i="1">
-                        <a:latin typeface="Cambria Math" panose="02040503050406030204" pitchFamily="18" charset="0"/>
-                      </a:rPr>
-                      <m:t>=107</m:t>
-                    </m:r>
-                  </m:oMath>
-                </a14:m>
-                <a:endParaRPr kumimoji="1" lang="en-US" altLang="ja-JP"/>
-              </a:p>
-              <a:p>
-                <a:pPr lvl="1"/>
-                <a:r>
-                  <a:rPr kumimoji="1" lang="ja-JP" altLang="en-US"/>
-                  <a:t>比較的容易に計算できる</a:t>
-                </a:r>
-                <a:endParaRPr kumimoji="1" lang="en-US" altLang="ja-JP"/>
-              </a:p>
-              <a:p>
-                <a:pPr lvl="1"/>
-                <a14:m>
-                  <m:oMath xmlns:m="http://schemas.openxmlformats.org/officeDocument/2006/math">
-                    <m:r>
-                      <a:rPr kumimoji="1" lang="en-US" altLang="ja-JP" b="0" i="1" smtClean="0">
-                        <a:latin typeface="Cambria Math" panose="02040503050406030204" pitchFamily="18" charset="0"/>
-                      </a:rPr>
-                      <m:t>(</m:t>
-                    </m:r>
-                    <m:r>
-                      <a:rPr kumimoji="1" lang="en-US" altLang="ja-JP" b="0" i="1" smtClean="0">
-                        <a:latin typeface="Cambria Math" panose="02040503050406030204" pitchFamily="18" charset="0"/>
-                      </a:rPr>
-                      <m:t>𝑛</m:t>
-                    </m:r>
-                    <m:r>
-                      <a:rPr kumimoji="1" lang="en-US" altLang="ja-JP" b="0" i="1" smtClean="0">
-                        <a:latin typeface="Cambria Math" panose="02040503050406030204" pitchFamily="18" charset="0"/>
-                      </a:rPr>
-                      <m:t>,</m:t>
-                    </m:r>
-                    <m:r>
-                      <a:rPr kumimoji="1" lang="en-US" altLang="ja-JP" b="0" i="1" smtClean="0">
-                        <a:latin typeface="Cambria Math" panose="02040503050406030204" pitchFamily="18" charset="0"/>
-                      </a:rPr>
-                      <m:t>𝑒</m:t>
-                    </m:r>
-                    <m:r>
-                      <a:rPr kumimoji="1" lang="en-US" altLang="ja-JP" b="0" i="1" smtClean="0">
-                        <a:latin typeface="Cambria Math" panose="02040503050406030204" pitchFamily="18" charset="0"/>
-                      </a:rPr>
-                      <m:t>)</m:t>
-                    </m:r>
-                  </m:oMath>
-                </a14:m>
-                <a:r>
-                  <a:rPr kumimoji="1" lang="ja-JP" altLang="en-US"/>
-                  <a:t>が公開鍵で</a:t>
-                </a:r>
-                <a14:m>
-                  <m:oMath xmlns:m="http://schemas.openxmlformats.org/officeDocument/2006/math">
-                    <m:r>
-                      <a:rPr kumimoji="1" lang="en-US" altLang="ja-JP" b="0" i="1" smtClean="0">
-                        <a:latin typeface="Cambria Math" panose="02040503050406030204" pitchFamily="18" charset="0"/>
-                      </a:rPr>
-                      <m:t>𝑑</m:t>
-                    </m:r>
-                  </m:oMath>
-                </a14:m>
-                <a:r>
-                  <a:rPr kumimoji="1" lang="ja-JP" altLang="en-US"/>
-                  <a:t>が秘密鍵</a:t>
-                </a:r>
-                <a:endParaRPr kumimoji="1" lang="en-US" altLang="ja-JP"/>
-              </a:p>
-              <a:p>
-                <a:r>
-                  <a:rPr kumimoji="1" lang="ja-JP" altLang="en-US"/>
-                  <a:t>平文</a:t>
-                </a:r>
-                <a14:m>
-                  <m:oMath xmlns:m="http://schemas.openxmlformats.org/officeDocument/2006/math">
-                    <m:r>
-                      <a:rPr kumimoji="1" lang="en-US" altLang="ja-JP" b="0" i="1" smtClean="0">
-                        <a:latin typeface="Cambria Math" panose="02040503050406030204" pitchFamily="18" charset="0"/>
-                      </a:rPr>
-                      <m:t>𝑚</m:t>
-                    </m:r>
-                  </m:oMath>
-                </a14:m>
-                <a:r>
-                  <a:rPr kumimoji="1" lang="ja-JP" altLang="en-US"/>
-                  <a:t>の暗号化</a:t>
-                </a:r>
-                <a:endParaRPr kumimoji="1" lang="en-US" altLang="ja-JP"/>
-              </a:p>
-              <a:p>
-                <a:pPr lvl="1"/>
-                <a14:m>
-                  <m:oMath xmlns:m="http://schemas.openxmlformats.org/officeDocument/2006/math">
-                    <m:r>
-                      <a:rPr kumimoji="1" lang="en-US" altLang="ja-JP" b="0" i="1" smtClean="0">
-                        <a:latin typeface="Cambria Math" panose="02040503050406030204" pitchFamily="18" charset="0"/>
-                      </a:rPr>
-                      <m:t>𝐸𝑛𝑐</m:t>
-                    </m:r>
-                    <m:d>
-                      <m:dPr>
-                        <m:ctrlPr>
-                          <a:rPr kumimoji="1" lang="en-US" altLang="ja-JP" b="0" i="1" smtClean="0">
-                            <a:latin typeface="Cambria Math" panose="02040503050406030204" pitchFamily="18" charset="0"/>
-                          </a:rPr>
-                        </m:ctrlPr>
-                      </m:dPr>
-                      <m:e>
-                        <m:r>
-                          <a:rPr kumimoji="1" lang="en-US" altLang="ja-JP" b="0" i="1" smtClean="0">
-                            <a:latin typeface="Cambria Math" panose="02040503050406030204" pitchFamily="18" charset="0"/>
-                          </a:rPr>
-                          <m:t>𝑚</m:t>
-                        </m:r>
-                      </m:e>
-                    </m:d>
-                    <m:r>
-                      <a:rPr kumimoji="1" lang="en-US" altLang="ja-JP" b="0" i="1" smtClean="0">
-                        <a:latin typeface="Cambria Math" panose="02040503050406030204" pitchFamily="18" charset="0"/>
-                      </a:rPr>
-                      <m:t>=</m:t>
-                    </m:r>
-                    <m:sSup>
-                      <m:sSupPr>
-                        <m:ctrlPr>
-                          <a:rPr kumimoji="1" lang="en-US" altLang="ja-JP" b="0" i="1" smtClean="0">
-                            <a:latin typeface="Cambria Math" panose="02040503050406030204" pitchFamily="18" charset="0"/>
-                          </a:rPr>
-                        </m:ctrlPr>
-                      </m:sSupPr>
-                      <m:e>
-                        <m:r>
-                          <a:rPr kumimoji="1" lang="en-US" altLang="ja-JP" b="0" i="1" smtClean="0">
-                            <a:latin typeface="Cambria Math" panose="02040503050406030204" pitchFamily="18" charset="0"/>
-                          </a:rPr>
-                          <m:t>𝑚</m:t>
-                        </m:r>
-                      </m:e>
-                      <m:sup>
-                        <m:r>
-                          <a:rPr kumimoji="1" lang="en-US" altLang="ja-JP" b="0" i="1" smtClean="0">
-                            <a:latin typeface="Cambria Math" panose="02040503050406030204" pitchFamily="18" charset="0"/>
-                          </a:rPr>
-                          <m:t>𝑒</m:t>
-                        </m:r>
-                      </m:sup>
-                    </m:sSup>
-                    <m:r>
-                      <a:rPr kumimoji="1" lang="en-US" altLang="ja-JP" b="0" i="1" smtClean="0">
-                        <a:latin typeface="Cambria Math" panose="02040503050406030204" pitchFamily="18" charset="0"/>
-                      </a:rPr>
-                      <m:t> </m:t>
-                    </m:r>
-                    <m:r>
-                      <m:rPr>
-                        <m:sty m:val="p"/>
-                      </m:rPr>
-                      <a:rPr kumimoji="1" lang="en-US" altLang="ja-JP" b="0" i="1" smtClean="0">
-                        <a:latin typeface="Cambria Math" panose="02040503050406030204" pitchFamily="18" charset="0"/>
-                      </a:rPr>
-                      <m:t>mod</m:t>
-                    </m:r>
-                    <m:r>
-                      <a:rPr kumimoji="1" lang="en-US" altLang="ja-JP" b="0" i="1" smtClean="0">
-                        <a:latin typeface="Cambria Math" panose="02040503050406030204" pitchFamily="18" charset="0"/>
-                      </a:rPr>
-                      <m:t> </m:t>
-                    </m:r>
-                    <m:r>
-                      <a:rPr kumimoji="1" lang="en-US" altLang="ja-JP" b="0" i="1" smtClean="0">
-                        <a:latin typeface="Cambria Math" panose="02040503050406030204" pitchFamily="18" charset="0"/>
-                      </a:rPr>
-                      <m:t>𝑛</m:t>
-                    </m:r>
-                  </m:oMath>
-                </a14:m>
-                <a:endParaRPr kumimoji="1" lang="en-US" altLang="ja-JP"/>
-              </a:p>
-              <a:p>
-                <a:r>
-                  <a:rPr kumimoji="1" lang="ja-JP" altLang="en-US"/>
-                  <a:t>暗号文</a:t>
-                </a:r>
-                <a14:m>
-                  <m:oMath xmlns:m="http://schemas.openxmlformats.org/officeDocument/2006/math">
-                    <m:r>
-                      <a:rPr kumimoji="1" lang="en-US" altLang="ja-JP" b="0" i="1" smtClean="0">
-                        <a:latin typeface="Cambria Math" panose="02040503050406030204" pitchFamily="18" charset="0"/>
-                      </a:rPr>
-                      <m:t>𝑐</m:t>
-                    </m:r>
-                  </m:oMath>
-                </a14:m>
-                <a:r>
-                  <a:rPr kumimoji="1" lang="ja-JP" altLang="en-US"/>
-                  <a:t>の復号</a:t>
-                </a:r>
-                <a:endParaRPr kumimoji="1" lang="en-US" altLang="ja-JP"/>
-              </a:p>
-              <a:p>
-                <a:pPr lvl="1"/>
-                <a14:m>
-                  <m:oMath xmlns:m="http://schemas.openxmlformats.org/officeDocument/2006/math">
-                    <m:r>
-                      <a:rPr kumimoji="1" lang="en-US" altLang="ja-JP" b="0" i="1" smtClean="0">
-                        <a:latin typeface="Cambria Math" panose="02040503050406030204" pitchFamily="18" charset="0"/>
-                      </a:rPr>
-                      <m:t>𝐷𝑒𝑐</m:t>
-                    </m:r>
-                    <m:d>
-                      <m:dPr>
-                        <m:ctrlPr>
-                          <a:rPr kumimoji="1" lang="en-US" altLang="ja-JP" b="0" i="1" smtClean="0">
-                            <a:latin typeface="Cambria Math" panose="02040503050406030204" pitchFamily="18" charset="0"/>
-                          </a:rPr>
-                        </m:ctrlPr>
-                      </m:dPr>
-                      <m:e>
-                        <m:r>
-                          <a:rPr kumimoji="1" lang="en-US" altLang="ja-JP" b="0" i="1" smtClean="0">
-                            <a:latin typeface="Cambria Math" panose="02040503050406030204" pitchFamily="18" charset="0"/>
-                          </a:rPr>
-                          <m:t>𝑐</m:t>
-                        </m:r>
-                      </m:e>
-                    </m:d>
-                    <m:r>
-                      <a:rPr kumimoji="1" lang="en-US" altLang="ja-JP" b="0" i="1" smtClean="0">
-                        <a:latin typeface="Cambria Math" panose="02040503050406030204" pitchFamily="18" charset="0"/>
-                      </a:rPr>
-                      <m:t>=</m:t>
-                    </m:r>
-                    <m:sSup>
-                      <m:sSupPr>
-                        <m:ctrlPr>
-                          <a:rPr kumimoji="1" lang="en-US" altLang="ja-JP" b="0" i="1" smtClean="0">
-                            <a:latin typeface="Cambria Math" panose="02040503050406030204" pitchFamily="18" charset="0"/>
-                          </a:rPr>
-                        </m:ctrlPr>
-                      </m:sSupPr>
-                      <m:e>
-                        <m:r>
-                          <a:rPr kumimoji="1" lang="en-US" altLang="ja-JP" b="0" i="1" smtClean="0">
-                            <a:latin typeface="Cambria Math" panose="02040503050406030204" pitchFamily="18" charset="0"/>
-                          </a:rPr>
-                          <m:t>𝑐</m:t>
-                        </m:r>
-                      </m:e>
-                      <m:sup>
-                        <m:r>
-                          <a:rPr kumimoji="1" lang="en-US" altLang="ja-JP" b="0" i="1" smtClean="0">
-                            <a:latin typeface="Cambria Math" panose="02040503050406030204" pitchFamily="18" charset="0"/>
-                          </a:rPr>
-                          <m:t>𝑑</m:t>
-                        </m:r>
-                      </m:sup>
-                    </m:sSup>
-                    <m:r>
-                      <a:rPr kumimoji="1" lang="en-US" altLang="ja-JP" b="0" i="1" smtClean="0">
-                        <a:latin typeface="Cambria Math" panose="02040503050406030204" pitchFamily="18" charset="0"/>
-                      </a:rPr>
-                      <m:t> </m:t>
-                    </m:r>
-                    <m:r>
-                      <m:rPr>
-                        <m:sty m:val="p"/>
-                      </m:rPr>
-                      <a:rPr kumimoji="1" lang="en-US" altLang="ja-JP" b="0" i="1" smtClean="0">
-                        <a:latin typeface="Cambria Math" panose="02040503050406030204" pitchFamily="18" charset="0"/>
-                      </a:rPr>
-                      <m:t>mod</m:t>
-                    </m:r>
-                    <m:r>
-                      <a:rPr kumimoji="1" lang="en-US" altLang="ja-JP" b="0" i="1" smtClean="0">
-                        <a:latin typeface="Cambria Math" panose="02040503050406030204" pitchFamily="18" charset="0"/>
-                      </a:rPr>
-                      <m:t> </m:t>
-                    </m:r>
-                    <m:r>
-                      <a:rPr kumimoji="1" lang="en-US" altLang="ja-JP" b="0" i="1" smtClean="0">
-                        <a:latin typeface="Cambria Math" panose="02040503050406030204" pitchFamily="18" charset="0"/>
-                      </a:rPr>
-                      <m:t>𝑛</m:t>
-                    </m:r>
-                  </m:oMath>
-                </a14:m>
-                <a:endParaRPr kumimoji="1" lang="en-US" altLang="ja-JP"/>
-              </a:p>
-              <a:p>
-                <a:pPr lvl="1"/>
-                <a:endParaRPr kumimoji="1" lang="ja-JP" altLang="en-US"/>
-              </a:p>
-            </p:txBody>
-          </p:sp>
-        </mc:Choice>
-        <mc:Fallback xmlns="">
-          <p:sp>
-            <p:nvSpPr>
-              <p:cNvPr id="2" name="コンテンツ プレースホルダー 1">
-                <a:extLst>
-                  <a:ext uri="{FF2B5EF4-FFF2-40B4-BE49-F238E27FC236}">
-                    <a16:creationId xmlns:a16="http://schemas.microsoft.com/office/drawing/2014/main" id="{FF3CD97D-46FD-45F6-A46D-44F67556EBFB}"/>
-                  </a:ext>
-                </a:extLst>
-              </p:cNvPr>
-              <p:cNvSpPr>
-                <a:spLocks noGrp="1" noRot="1" noChangeAspect="1" noMove="1" noResize="1" noEditPoints="1" noAdjustHandles="1" noChangeArrowheads="1" noChangeShapeType="1" noTextEdit="1"/>
-              </p:cNvSpPr>
-              <p:nvPr>
-                <p:ph idx="1"/>
-              </p:nvPr>
-            </p:nvSpPr>
-            <p:spPr>
-              <a:blipFill>
-                <a:blip r:embed="rId2"/>
-                <a:stretch>
-                  <a:fillRect l="-1200" t="-1038"/>
-                </a:stretch>
-              </a:blipFill>
-            </p:spPr>
-            <p:txBody>
-              <a:bodyPr/>
-              <a:lstStyle/>
-              <a:p>
-                <a:r>
-                  <a:rPr lang="ja-JP" altLang="en-US">
-                    <a:noFill/>
-                  </a:rPr>
-                  <a:t> </a:t>
-                </a:r>
-              </a:p>
-            </p:txBody>
-          </p:sp>
-        </mc:Fallback>
-      </mc:AlternateContent>
-      <p:sp>
-        <p:nvSpPr>
-          <p:cNvPr id="3" name="スライド番号プレースホルダー 2">
-            <a:extLst>
-              <a:ext uri="{FF2B5EF4-FFF2-40B4-BE49-F238E27FC236}">
-                <a16:creationId xmlns:a16="http://schemas.microsoft.com/office/drawing/2014/main" id="{827D37DF-0E2F-4FFC-BEC1-2CB5EABEFB69}"/>
-              </a:ext>
-            </a:extLst>
-          </p:cNvPr>
-          <p:cNvSpPr>
-            <a:spLocks noGrp="1"/>
-          </p:cNvSpPr>
-          <p:nvPr>
-            <p:ph type="sldNum" sz="quarter" idx="12"/>
-          </p:nvPr>
-        </p:nvSpPr>
-        <p:spPr/>
-        <p:txBody>
-          <a:bodyPr/>
-          <a:lstStyle/>
-          <a:p>
-            <a:pPr>
-              <a:defRPr/>
-            </a:pPr>
-            <a:r>
-              <a:rPr lang="en-US" altLang="ja-JP"/>
-              <a:t>    </a:t>
-            </a:r>
-            <a:fld id="{B2782DEB-472A-4FE5-AC34-C17109CF5A91}" type="slidenum">
-              <a:rPr lang="en-US" altLang="ja-JP" smtClean="0"/>
-              <a:pPr>
-                <a:defRPr/>
-              </a:pPr>
-              <a:t>22</a:t>
-            </a:fld>
-            <a:r>
-              <a:rPr lang="en-US" altLang="ja-JP"/>
-              <a:t> / 24</a:t>
-            </a:r>
-          </a:p>
-        </p:txBody>
-      </p:sp>
-      <p:sp>
-        <p:nvSpPr>
-          <p:cNvPr id="4" name="タイトル 3">
-            <a:extLst>
-              <a:ext uri="{FF2B5EF4-FFF2-40B4-BE49-F238E27FC236}">
-                <a16:creationId xmlns:a16="http://schemas.microsoft.com/office/drawing/2014/main" id="{9D565A36-B42E-4428-ADAB-9B3D33CCCE4F}"/>
-              </a:ext>
-            </a:extLst>
-          </p:cNvPr>
-          <p:cNvSpPr>
-            <a:spLocks noGrp="1"/>
-          </p:cNvSpPr>
-          <p:nvPr>
-            <p:ph type="title"/>
-          </p:nvPr>
-        </p:nvSpPr>
-        <p:spPr/>
-        <p:txBody>
-          <a:bodyPr/>
-          <a:lstStyle/>
-          <a:p>
-            <a:r>
-              <a:rPr kumimoji="1" lang="en-US" altLang="ja-JP"/>
-              <a:t>RSA</a:t>
-            </a:r>
-            <a:r>
-              <a:rPr kumimoji="1" lang="ja-JP" altLang="en-US"/>
-              <a:t>暗号の作り方</a:t>
-            </a:r>
-          </a:p>
-        </p:txBody>
-      </p:sp>
-    </p:spTree>
-    <p:extLst>
-      <p:ext uri="{BB962C8B-B14F-4D97-AF65-F5344CB8AC3E}">
-        <p14:creationId xmlns:p14="http://schemas.microsoft.com/office/powerpoint/2010/main" val="3063434139"/>
-      </p:ext>
-    </p:extLst>
-  </p:cSld>
-  <p:clrMapOvr>
-    <a:masterClrMapping/>
-  </p:clrMapOvr>
-</p:sld>
-</file>
-
-<file path=ppt/slides/slide23.xml><?xml version="1.0" encoding="utf-8"?>
-<p:sld xmlns:a="http://schemas.openxmlformats.org/drawingml/2006/main" xmlns:r="http://schemas.openxmlformats.org/officeDocument/2006/relationships" xmlns:p="http://schemas.openxmlformats.org/presentationml/2006/main">
-  <p:cSld>
-    <p:spTree>
-      <p:nvGrpSpPr>
-        <p:cNvPr id="1" name=""/>
-        <p:cNvGrpSpPr/>
-        <p:nvPr/>
-      </p:nvGrpSpPr>
-      <p:grpSpPr>
-        <a:xfrm>
-          <a:off x="0" y="0"/>
-          <a:ext cx="0" cy="0"/>
-          <a:chOff x="0" y="0"/>
-          <a:chExt cx="0" cy="0"/>
-        </a:xfrm>
-      </p:grpSpPr>
-      <mc:AlternateContent xmlns:mc="http://schemas.openxmlformats.org/markup-compatibility/2006" xmlns:a14="http://schemas.microsoft.com/office/drawing/2010/main">
-        <mc:Choice Requires="a14">
-          <p:sp>
-            <p:nvSpPr>
-              <p:cNvPr id="2" name="コンテンツ プレースホルダー 1">
-                <a:extLst>
-                  <a:ext uri="{FF2B5EF4-FFF2-40B4-BE49-F238E27FC236}">
-                    <a16:creationId xmlns:a16="http://schemas.microsoft.com/office/drawing/2014/main" id="{0F36FD6E-BD50-4126-82A6-708EA115C8D9}"/>
-                  </a:ext>
-                </a:extLst>
-              </p:cNvPr>
-              <p:cNvSpPr>
-                <a:spLocks noGrp="1"/>
-              </p:cNvSpPr>
-              <p:nvPr>
-                <p:ph idx="1"/>
-              </p:nvPr>
-            </p:nvSpPr>
-            <p:spPr/>
-            <p:txBody>
-              <a:bodyPr/>
-              <a:lstStyle/>
-              <a:p>
-                <a:r>
-                  <a:rPr kumimoji="1" lang="en-US" altLang="ja-JP"/>
-                  <a:t>RSA</a:t>
-                </a:r>
-                <a:r>
-                  <a:rPr kumimoji="1" lang="ja-JP" altLang="en-US"/>
-                  <a:t>仮定</a:t>
-                </a:r>
-                <a:endParaRPr kumimoji="1" lang="en-US" altLang="ja-JP"/>
-              </a:p>
-              <a:p>
-                <a:pPr lvl="1"/>
-                <a14:m>
-                  <m:oMath xmlns:m="http://schemas.openxmlformats.org/officeDocument/2006/math">
-                    <m:r>
-                      <a:rPr kumimoji="1" lang="en-US" altLang="ja-JP" b="0" i="1" smtClean="0">
-                        <a:latin typeface="Cambria Math" panose="02040503050406030204" pitchFamily="18" charset="0"/>
-                      </a:rPr>
-                      <m:t>(</m:t>
-                    </m:r>
-                    <m:r>
-                      <a:rPr kumimoji="1" lang="en-US" altLang="ja-JP" b="0" i="1" smtClean="0">
-                        <a:latin typeface="Cambria Math" panose="02040503050406030204" pitchFamily="18" charset="0"/>
-                      </a:rPr>
-                      <m:t>𝑛</m:t>
-                    </m:r>
-                    <m:r>
-                      <a:rPr kumimoji="1" lang="en-US" altLang="ja-JP" b="0" i="1" smtClean="0">
-                        <a:latin typeface="Cambria Math" panose="02040503050406030204" pitchFamily="18" charset="0"/>
-                      </a:rPr>
-                      <m:t>, </m:t>
-                    </m:r>
-                    <m:r>
-                      <a:rPr kumimoji="1" lang="en-US" altLang="ja-JP" b="0" i="1" smtClean="0">
-                        <a:latin typeface="Cambria Math" panose="02040503050406030204" pitchFamily="18" charset="0"/>
-                      </a:rPr>
-                      <m:t>𝑒</m:t>
-                    </m:r>
-                    <m:r>
-                      <a:rPr kumimoji="1" lang="en-US" altLang="ja-JP" b="0" i="1" smtClean="0">
-                        <a:latin typeface="Cambria Math" panose="02040503050406030204" pitchFamily="18" charset="0"/>
-                      </a:rPr>
-                      <m:t>)</m:t>
-                    </m:r>
-                  </m:oMath>
-                </a14:m>
-                <a:r>
-                  <a:rPr kumimoji="1" lang="ja-JP" altLang="en-US"/>
-                  <a:t>と暗号文</a:t>
-                </a:r>
-                <a14:m>
-                  <m:oMath xmlns:m="http://schemas.openxmlformats.org/officeDocument/2006/math">
-                    <m:r>
-                      <a:rPr kumimoji="1" lang="en-US" altLang="ja-JP" b="0" i="1" smtClean="0">
-                        <a:latin typeface="Cambria Math" panose="02040503050406030204" pitchFamily="18" charset="0"/>
-                      </a:rPr>
-                      <m:t>𝑐</m:t>
-                    </m:r>
-                  </m:oMath>
-                </a14:m>
-                <a:r>
-                  <a:rPr kumimoji="1" lang="ja-JP" altLang="en-US"/>
-                  <a:t>から元の</a:t>
-                </a:r>
-                <a14:m>
-                  <m:oMath xmlns:m="http://schemas.openxmlformats.org/officeDocument/2006/math">
-                    <m:r>
-                      <a:rPr kumimoji="1" lang="en-US" altLang="ja-JP" b="0" i="1" smtClean="0">
-                        <a:latin typeface="Cambria Math" panose="02040503050406030204" pitchFamily="18" charset="0"/>
-                      </a:rPr>
-                      <m:t>𝑚</m:t>
-                    </m:r>
-                  </m:oMath>
-                </a14:m>
-                <a:r>
-                  <a:rPr kumimoji="1" lang="ja-JP" altLang="en-US"/>
-                  <a:t>は求められない</a:t>
-                </a:r>
-                <a:endParaRPr kumimoji="1" lang="en-US" altLang="ja-JP"/>
-              </a:p>
-              <a:p>
-                <a:pPr lvl="1"/>
-                <a:r>
-                  <a:rPr kumimoji="1" lang="ja-JP" altLang="en-US"/>
-                  <a:t>十分大きな素数</a:t>
-                </a:r>
-                <a14:m>
-                  <m:oMath xmlns:m="http://schemas.openxmlformats.org/officeDocument/2006/math">
-                    <m:r>
-                      <a:rPr kumimoji="1" lang="en-US" altLang="ja-JP" b="0" i="1" smtClean="0">
-                        <a:latin typeface="Cambria Math" panose="02040503050406030204" pitchFamily="18" charset="0"/>
-                      </a:rPr>
-                      <m:t>𝑝𝑞</m:t>
-                    </m:r>
-                  </m:oMath>
-                </a14:m>
-                <a:r>
-                  <a:rPr kumimoji="1" lang="ja-JP" altLang="en-US"/>
-                  <a:t>なら</a:t>
-                </a:r>
-                <a:r>
-                  <a:rPr kumimoji="1" lang="en-US" altLang="ja-JP"/>
-                  <a:t>RSA</a:t>
-                </a:r>
-                <a:r>
-                  <a:rPr kumimoji="1" lang="ja-JP" altLang="en-US"/>
-                  <a:t>仮定は成り立つ</a:t>
-                </a:r>
-                <a:r>
-                  <a:rPr kumimoji="1" lang="en-US" altLang="ja-JP"/>
-                  <a:t>(</a:t>
-                </a:r>
-                <a:r>
-                  <a:rPr kumimoji="1" lang="ja-JP" altLang="en-US"/>
-                  <a:t>と考えられている</a:t>
-                </a:r>
-                <a:r>
-                  <a:rPr kumimoji="1" lang="en-US" altLang="ja-JP"/>
-                  <a:t>)</a:t>
-                </a:r>
-              </a:p>
-              <a:p>
-                <a:pPr lvl="1"/>
-                <a14:m>
-                  <m:oMath xmlns:m="http://schemas.openxmlformats.org/officeDocument/2006/math">
-                    <m:r>
-                      <a:rPr kumimoji="1" lang="en-US" altLang="ja-JP" b="0" i="1" smtClean="0">
-                        <a:latin typeface="Cambria Math" panose="02040503050406030204" pitchFamily="18" charset="0"/>
-                      </a:rPr>
-                      <m:t>𝑛</m:t>
-                    </m:r>
-                    <m:r>
-                      <a:rPr kumimoji="1" lang="en-US" altLang="ja-JP" b="0" i="1" smtClean="0">
-                        <a:latin typeface="Cambria Math" panose="02040503050406030204" pitchFamily="18" charset="0"/>
-                      </a:rPr>
-                      <m:t>=</m:t>
-                    </m:r>
-                    <m:r>
-                      <a:rPr kumimoji="1" lang="en-US" altLang="ja-JP" b="0" i="1" smtClean="0">
-                        <a:latin typeface="Cambria Math" panose="02040503050406030204" pitchFamily="18" charset="0"/>
-                      </a:rPr>
-                      <m:t>𝑝𝑞</m:t>
-                    </m:r>
-                  </m:oMath>
-                </a14:m>
-                <a:r>
-                  <a:rPr kumimoji="1" lang="ja-JP" altLang="en-US"/>
-                  <a:t>の素因数分解ができれば</a:t>
-                </a:r>
-                <a:r>
-                  <a:rPr kumimoji="1" lang="en-US" altLang="ja-JP"/>
-                  <a:t>RSA</a:t>
-                </a:r>
-                <a:r>
-                  <a:rPr kumimoji="1" lang="ja-JP" altLang="en-US"/>
-                  <a:t>仮定は破れる</a:t>
-                </a:r>
-                <a:endParaRPr kumimoji="1" lang="en-US" altLang="ja-JP"/>
-              </a:p>
-              <a:p>
-                <a:r>
-                  <a:rPr kumimoji="1" lang="ja-JP" altLang="en-US"/>
-                  <a:t>落とし戸付き一方向性関数</a:t>
-                </a:r>
-                <a:r>
-                  <a:rPr kumimoji="1" lang="en-US" altLang="ja-JP"/>
-                  <a:t>(trapdoor function)</a:t>
-                </a:r>
-                <a:endParaRPr kumimoji="1" lang="ja-JP" altLang="en-US"/>
-              </a:p>
-            </p:txBody>
-          </p:sp>
-        </mc:Choice>
-        <mc:Fallback xmlns="">
-          <p:sp>
-            <p:nvSpPr>
-              <p:cNvPr id="2" name="コンテンツ プレースホルダー 1">
-                <a:extLst>
-                  <a:ext uri="{FF2B5EF4-FFF2-40B4-BE49-F238E27FC236}">
-                    <a16:creationId xmlns:a16="http://schemas.microsoft.com/office/drawing/2014/main" id="{0F36FD6E-BD50-4126-82A6-708EA115C8D9}"/>
-                  </a:ext>
-                </a:extLst>
-              </p:cNvPr>
-              <p:cNvSpPr>
-                <a:spLocks noGrp="1" noRot="1" noChangeAspect="1" noMove="1" noResize="1" noEditPoints="1" noAdjustHandles="1" noChangeArrowheads="1" noChangeShapeType="1" noTextEdit="1"/>
-              </p:cNvSpPr>
-              <p:nvPr>
-                <p:ph idx="1"/>
-              </p:nvPr>
-            </p:nvSpPr>
-            <p:spPr>
-              <a:blipFill>
-                <a:blip r:embed="rId2"/>
-                <a:stretch>
-                  <a:fillRect l="-1200" t="-1454" r="-200"/>
-                </a:stretch>
-              </a:blipFill>
-            </p:spPr>
-            <p:txBody>
-              <a:bodyPr/>
-              <a:lstStyle/>
-              <a:p>
-                <a:r>
-                  <a:rPr lang="ja-JP" altLang="en-US">
-                    <a:noFill/>
-                  </a:rPr>
-                  <a:t> </a:t>
-                </a:r>
-              </a:p>
-            </p:txBody>
-          </p:sp>
-        </mc:Fallback>
-      </mc:AlternateContent>
-      <p:sp>
-        <p:nvSpPr>
-          <p:cNvPr id="3" name="スライド番号プレースホルダー 2">
-            <a:extLst>
-              <a:ext uri="{FF2B5EF4-FFF2-40B4-BE49-F238E27FC236}">
-                <a16:creationId xmlns:a16="http://schemas.microsoft.com/office/drawing/2014/main" id="{1C8205DE-1EC8-4033-817B-6BCABD4080D8}"/>
-              </a:ext>
-            </a:extLst>
-          </p:cNvPr>
-          <p:cNvSpPr>
-            <a:spLocks noGrp="1"/>
-          </p:cNvSpPr>
-          <p:nvPr>
-            <p:ph type="sldNum" sz="quarter" idx="12"/>
-          </p:nvPr>
-        </p:nvSpPr>
-        <p:spPr/>
-        <p:txBody>
-          <a:bodyPr/>
-          <a:lstStyle/>
-          <a:p>
-            <a:pPr>
-              <a:defRPr/>
-            </a:pPr>
-            <a:r>
-              <a:rPr lang="en-US" altLang="ja-JP"/>
-              <a:t>    </a:t>
-            </a:r>
-            <a:fld id="{B2782DEB-472A-4FE5-AC34-C17109CF5A91}" type="slidenum">
-              <a:rPr lang="en-US" altLang="ja-JP" smtClean="0"/>
-              <a:pPr>
-                <a:defRPr/>
-              </a:pPr>
-              <a:t>23</a:t>
-            </a:fld>
-            <a:r>
-              <a:rPr lang="en-US" altLang="ja-JP"/>
-              <a:t> / 24</a:t>
-            </a:r>
-          </a:p>
-        </p:txBody>
-      </p:sp>
-      <p:sp>
-        <p:nvSpPr>
-          <p:cNvPr id="4" name="タイトル 3">
-            <a:extLst>
-              <a:ext uri="{FF2B5EF4-FFF2-40B4-BE49-F238E27FC236}">
-                <a16:creationId xmlns:a16="http://schemas.microsoft.com/office/drawing/2014/main" id="{E0E751AE-DE15-487D-9694-990B45305B9C}"/>
-              </a:ext>
-            </a:extLst>
-          </p:cNvPr>
-          <p:cNvSpPr>
-            <a:spLocks noGrp="1"/>
-          </p:cNvSpPr>
-          <p:nvPr>
-            <p:ph type="title"/>
-          </p:nvPr>
-        </p:nvSpPr>
-        <p:spPr/>
-        <p:txBody>
-          <a:bodyPr/>
-          <a:lstStyle/>
-          <a:p>
-            <a:r>
-              <a:rPr kumimoji="1" lang="en-US" altLang="ja-JP"/>
-              <a:t>RSA</a:t>
-            </a:r>
-            <a:r>
-              <a:rPr kumimoji="1" lang="ja-JP" altLang="en-US"/>
-              <a:t>暗号の安全性</a:t>
-            </a:r>
-          </a:p>
-        </p:txBody>
-      </p:sp>
-      <p:pic>
-        <p:nvPicPr>
-          <p:cNvPr id="6" name="図 5">
-            <a:extLst>
-              <a:ext uri="{FF2B5EF4-FFF2-40B4-BE49-F238E27FC236}">
-                <a16:creationId xmlns:a16="http://schemas.microsoft.com/office/drawing/2014/main" id="{275E999B-7F98-4641-8C61-1027D75F7B04}"/>
-              </a:ext>
-            </a:extLst>
-          </p:cNvPr>
-          <p:cNvPicPr>
-            <a:picLocks noChangeAspect="1"/>
-          </p:cNvPicPr>
-          <p:nvPr/>
-        </p:nvPicPr>
-        <p:blipFill>
-          <a:blip r:embed="rId3">
-            <a:extLst>
-              <a:ext uri="{28A0092B-C50C-407E-A947-70E740481C1C}">
-                <a14:useLocalDpi xmlns:a14="http://schemas.microsoft.com/office/drawing/2010/main" val="0"/>
-              </a:ext>
-            </a:extLst>
-          </a:blip>
-          <a:stretch>
-            <a:fillRect/>
-          </a:stretch>
-        </p:blipFill>
-        <p:spPr>
-          <a:xfrm>
-            <a:off x="1691680" y="3212976"/>
-            <a:ext cx="5832648" cy="3127758"/>
-          </a:xfrm>
-          <a:prstGeom prst="rect">
-            <a:avLst/>
-          </a:prstGeom>
-        </p:spPr>
-      </p:pic>
-    </p:spTree>
-    <p:extLst>
-      <p:ext uri="{BB962C8B-B14F-4D97-AF65-F5344CB8AC3E}">
-        <p14:creationId xmlns:p14="http://schemas.microsoft.com/office/powerpoint/2010/main" val="2274810597"/>
-      </p:ext>
-    </p:extLst>
-  </p:cSld>
-  <p:clrMapOvr>
-    <a:masterClrMapping/>
-  </p:clrMapOvr>
-</p:sld>
-</file>
-
-<file path=ppt/slides/slide24.xml><?xml version="1.0" encoding="utf-8"?>
-<p:sld xmlns:a="http://schemas.openxmlformats.org/drawingml/2006/main" xmlns:r="http://schemas.openxmlformats.org/officeDocument/2006/relationships" xmlns:p="http://schemas.openxmlformats.org/presentationml/2006/main">
-  <p:cSld>
-    <p:spTree>
-      <p:nvGrpSpPr>
-        <p:cNvPr id="1" name=""/>
-        <p:cNvGrpSpPr/>
-        <p:nvPr/>
-      </p:nvGrpSpPr>
-      <p:grpSpPr>
-        <a:xfrm>
-          <a:off x="0" y="0"/>
-          <a:ext cx="0" cy="0"/>
-          <a:chOff x="0" y="0"/>
-          <a:chExt cx="0" cy="0"/>
-        </a:xfrm>
-      </p:grpSpPr>
-      <p:sp>
-        <p:nvSpPr>
-          <p:cNvPr id="2" name="コンテンツ プレースホルダー 1">
-            <a:extLst>
-              <a:ext uri="{FF2B5EF4-FFF2-40B4-BE49-F238E27FC236}">
-                <a16:creationId xmlns:a16="http://schemas.microsoft.com/office/drawing/2014/main" id="{61BFF72D-AA23-4704-A100-96E33144ED8C}"/>
-              </a:ext>
-            </a:extLst>
-          </p:cNvPr>
-          <p:cNvSpPr>
-            <a:spLocks noGrp="1"/>
-          </p:cNvSpPr>
-          <p:nvPr>
-            <p:ph idx="1"/>
-          </p:nvPr>
-        </p:nvSpPr>
-        <p:spPr/>
-        <p:txBody>
-          <a:bodyPr/>
-          <a:lstStyle/>
-          <a:p>
-            <a:r>
-              <a:rPr kumimoji="1" lang="ja-JP" altLang="en-US"/>
-              <a:t>前述の</a:t>
-            </a:r>
-            <a:r>
-              <a:rPr kumimoji="1" lang="en-US" altLang="ja-JP"/>
-              <a:t>(</a:t>
-            </a:r>
-            <a:r>
-              <a:rPr kumimoji="1" lang="ja-JP" altLang="en-US"/>
-              <a:t>大抵の暗号の本に載ってる</a:t>
-            </a:r>
-            <a:r>
-              <a:rPr kumimoji="1" lang="en-US" altLang="ja-JP"/>
-              <a:t>)RSA</a:t>
-            </a:r>
-            <a:r>
-              <a:rPr kumimoji="1" lang="ja-JP" altLang="en-US"/>
-              <a:t>暗号は</a:t>
-            </a:r>
-            <a:br>
-              <a:rPr kumimoji="1" lang="en-US" altLang="ja-JP"/>
-            </a:br>
-            <a:r>
-              <a:rPr kumimoji="1" lang="ja-JP" altLang="en-US"/>
-              <a:t>安全ではないので使ってはいけない</a:t>
-            </a:r>
-            <a:endParaRPr kumimoji="1" lang="en-US" altLang="ja-JP"/>
-          </a:p>
-          <a:p>
-            <a:pPr lvl="1"/>
-            <a:r>
-              <a:rPr kumimoji="1" lang="ja-JP" altLang="en-US"/>
-              <a:t>乱数を含まない決定的アルゴリズム</a:t>
-            </a:r>
-            <a:endParaRPr kumimoji="1" lang="en-US" altLang="ja-JP"/>
-          </a:p>
-          <a:p>
-            <a:pPr lvl="1"/>
-            <a:r>
-              <a:rPr lang="en-US" altLang="ja-JP"/>
-              <a:t>0</a:t>
-            </a:r>
-            <a:r>
-              <a:rPr lang="ja-JP" altLang="en-US"/>
-              <a:t>や</a:t>
-            </a:r>
-            <a:r>
-              <a:rPr lang="en-US" altLang="ja-JP"/>
-              <a:t>1</a:t>
-            </a:r>
-            <a:r>
-              <a:rPr lang="ja-JP" altLang="en-US"/>
-              <a:t>の暗号文はいつも</a:t>
-            </a:r>
-            <a:r>
-              <a:rPr lang="en-US" altLang="ja-JP"/>
-              <a:t>0</a:t>
-            </a:r>
-            <a:r>
-              <a:rPr lang="ja-JP" altLang="en-US"/>
-              <a:t>や</a:t>
-            </a:r>
-            <a:r>
-              <a:rPr lang="en-US" altLang="ja-JP"/>
-              <a:t>1</a:t>
-            </a:r>
-          </a:p>
-          <a:p>
-            <a:r>
-              <a:rPr lang="en-US" altLang="ja-JP"/>
-              <a:t>PKCS#1 v1.5</a:t>
-            </a:r>
-            <a:r>
-              <a:rPr lang="ja-JP" altLang="en-US"/>
-              <a:t>（</a:t>
-            </a:r>
-            <a:r>
-              <a:rPr lang="en-US" altLang="ja-JP"/>
-              <a:t>Public-Key Cryptography Standards</a:t>
-            </a:r>
-            <a:r>
-              <a:rPr lang="ja-JP" altLang="en-US"/>
-              <a:t>）</a:t>
-            </a:r>
-            <a:endParaRPr lang="en-US" altLang="ja-JP"/>
-          </a:p>
-          <a:p>
-            <a:pPr lvl="1"/>
-            <a:r>
-              <a:rPr kumimoji="1" lang="ja-JP" altLang="en-US"/>
-              <a:t>広く使われる安全な</a:t>
-            </a:r>
-            <a:r>
-              <a:rPr kumimoji="1" lang="en-US" altLang="ja-JP"/>
-              <a:t>RSA</a:t>
-            </a:r>
-            <a:r>
-              <a:rPr kumimoji="1" lang="ja-JP" altLang="en-US"/>
-              <a:t>暗号の方式</a:t>
-            </a:r>
-            <a:endParaRPr kumimoji="1" lang="en-US" altLang="ja-JP"/>
-          </a:p>
-          <a:p>
-            <a:r>
-              <a:rPr lang="en-US" altLang="ja-JP"/>
-              <a:t>RSA-OAEP</a:t>
-            </a:r>
-          </a:p>
-          <a:p>
-            <a:pPr lvl="1"/>
-            <a:r>
-              <a:rPr kumimoji="1" lang="en-US" altLang="ja-JP"/>
-              <a:t>CRYPTREC</a:t>
-            </a:r>
-            <a:r>
-              <a:rPr kumimoji="1" lang="ja-JP" altLang="en-US"/>
-              <a:t>の電子政府推奨暗号リストにある方式</a:t>
-            </a:r>
-          </a:p>
-        </p:txBody>
-      </p:sp>
-      <p:sp>
-        <p:nvSpPr>
-          <p:cNvPr id="3" name="スライド番号プレースホルダー 2">
-            <a:extLst>
-              <a:ext uri="{FF2B5EF4-FFF2-40B4-BE49-F238E27FC236}">
-                <a16:creationId xmlns:a16="http://schemas.microsoft.com/office/drawing/2014/main" id="{4CC55BEA-6757-490A-92EC-3CCEE5D57174}"/>
-              </a:ext>
-            </a:extLst>
-          </p:cNvPr>
-          <p:cNvSpPr>
-            <a:spLocks noGrp="1"/>
-          </p:cNvSpPr>
-          <p:nvPr>
-            <p:ph type="sldNum" sz="quarter" idx="12"/>
-          </p:nvPr>
-        </p:nvSpPr>
-        <p:spPr/>
-        <p:txBody>
-          <a:bodyPr/>
-          <a:lstStyle/>
-          <a:p>
-            <a:pPr>
-              <a:defRPr/>
-            </a:pPr>
-            <a:r>
-              <a:rPr lang="en-US" altLang="ja-JP"/>
-              <a:t>    </a:t>
-            </a:r>
-            <a:fld id="{B2782DEB-472A-4FE5-AC34-C17109CF5A91}" type="slidenum">
-              <a:rPr lang="en-US" altLang="ja-JP" smtClean="0"/>
-              <a:pPr>
-                <a:defRPr/>
-              </a:pPr>
-              <a:t>24</a:t>
-            </a:fld>
-            <a:r>
-              <a:rPr lang="en-US" altLang="ja-JP"/>
-              <a:t> / 24</a:t>
-            </a:r>
-          </a:p>
-        </p:txBody>
-      </p:sp>
-      <p:sp>
-        <p:nvSpPr>
-          <p:cNvPr id="4" name="タイトル 3">
-            <a:extLst>
-              <a:ext uri="{FF2B5EF4-FFF2-40B4-BE49-F238E27FC236}">
-                <a16:creationId xmlns:a16="http://schemas.microsoft.com/office/drawing/2014/main" id="{0BCFF976-C626-4CA3-B61B-EF75160D11B9}"/>
-              </a:ext>
-            </a:extLst>
-          </p:cNvPr>
-          <p:cNvSpPr>
-            <a:spLocks noGrp="1"/>
-          </p:cNvSpPr>
-          <p:nvPr>
-            <p:ph type="title"/>
-          </p:nvPr>
-        </p:nvSpPr>
-        <p:spPr/>
-        <p:txBody>
-          <a:bodyPr/>
-          <a:lstStyle/>
-          <a:p>
-            <a:r>
-              <a:rPr kumimoji="1" lang="ja-JP" altLang="en-US"/>
-              <a:t>実際に使われる</a:t>
-            </a:r>
-            <a:r>
-              <a:rPr kumimoji="1" lang="en-US" altLang="ja-JP"/>
-              <a:t>RSA</a:t>
-            </a:r>
-            <a:r>
-              <a:rPr kumimoji="1" lang="ja-JP" altLang="en-US"/>
-              <a:t>暗号</a:t>
-            </a:r>
-          </a:p>
-        </p:txBody>
-      </p:sp>
-      <p:graphicFrame>
-        <p:nvGraphicFramePr>
-          <p:cNvPr id="5" name="表 5">
-            <a:extLst>
-              <a:ext uri="{FF2B5EF4-FFF2-40B4-BE49-F238E27FC236}">
-                <a16:creationId xmlns:a16="http://schemas.microsoft.com/office/drawing/2014/main" id="{B67FFAE0-CB5B-4F29-BA1B-B7E48281AA77}"/>
-              </a:ext>
-            </a:extLst>
-          </p:cNvPr>
-          <p:cNvGraphicFramePr>
-            <a:graphicFrameLocks noGrp="1"/>
-          </p:cNvGraphicFramePr>
-          <p:nvPr>
-            <p:extLst>
-              <p:ext uri="{D42A27DB-BD31-4B8C-83A1-F6EECF244321}">
-                <p14:modId xmlns:p14="http://schemas.microsoft.com/office/powerpoint/2010/main" val="1673739861"/>
-              </p:ext>
-            </p:extLst>
-          </p:nvPr>
-        </p:nvGraphicFramePr>
-        <p:xfrm>
-          <a:off x="1077055" y="4869160"/>
-          <a:ext cx="6989890" cy="1483360"/>
-        </p:xfrm>
-        <a:graphic>
-          <a:graphicData uri="http://schemas.openxmlformats.org/drawingml/2006/table">
-            <a:tbl>
-              <a:tblPr firstRow="1" bandRow="1">
-                <a:tableStyleId>{5C22544A-7EE6-4342-B048-85BDC9FD1C3A}</a:tableStyleId>
-              </a:tblPr>
-              <a:tblGrid>
-                <a:gridCol w="3316097">
-                  <a:extLst>
-                    <a:ext uri="{9D8B030D-6E8A-4147-A177-3AD203B41FA5}">
-                      <a16:colId xmlns:a16="http://schemas.microsoft.com/office/drawing/2014/main" val="1216449925"/>
-                    </a:ext>
-                  </a:extLst>
-                </a:gridCol>
-                <a:gridCol w="3673793">
-                  <a:extLst>
-                    <a:ext uri="{9D8B030D-6E8A-4147-A177-3AD203B41FA5}">
-                      <a16:colId xmlns:a16="http://schemas.microsoft.com/office/drawing/2014/main" val="2735587953"/>
-                    </a:ext>
-                  </a:extLst>
-                </a:gridCol>
-              </a:tblGrid>
-              <a:tr h="370840">
-                <a:tc>
-                  <a:txBody>
-                    <a:bodyPr/>
-                    <a:lstStyle/>
-                    <a:p>
-                      <a:r>
-                        <a:rPr lang="en-US"/>
-                        <a:t>RSA</a:t>
-                      </a:r>
-                      <a:r>
-                        <a:rPr lang="ja-JP" altLang="en-US"/>
-                        <a:t>暗号の方式</a:t>
-                      </a:r>
-                    </a:p>
-                  </a:txBody>
-                  <a:tcPr anchor="ctr"/>
-                </a:tc>
-                <a:tc>
-                  <a:txBody>
-                    <a:bodyPr/>
-                    <a:lstStyle/>
-                    <a:p>
-                      <a:r>
-                        <a:rPr lang="ja-JP" altLang="en-US"/>
-                        <a:t>安全性</a:t>
-                      </a:r>
-                    </a:p>
-                  </a:txBody>
-                  <a:tcPr anchor="ctr"/>
-                </a:tc>
-                <a:extLst>
-                  <a:ext uri="{0D108BD9-81ED-4DB2-BD59-A6C34878D82A}">
-                    <a16:rowId xmlns:a16="http://schemas.microsoft.com/office/drawing/2014/main" val="2594480207"/>
-                  </a:ext>
-                </a:extLst>
-              </a:tr>
-              <a:tr h="370840">
-                <a:tc>
-                  <a:txBody>
-                    <a:bodyPr/>
-                    <a:lstStyle/>
-                    <a:p>
-                      <a:r>
-                        <a:rPr lang="en-US" altLang="ja-JP"/>
-                        <a:t>RSA</a:t>
-                      </a:r>
-                      <a:r>
-                        <a:rPr lang="ja-JP" altLang="en-US"/>
-                        <a:t>暗号の基本方式</a:t>
-                      </a:r>
-                    </a:p>
-                  </a:txBody>
-                  <a:tcPr anchor="ctr"/>
-                </a:tc>
-                <a:tc>
-                  <a:txBody>
-                    <a:bodyPr/>
-                    <a:lstStyle/>
-                    <a:p>
-                      <a:r>
-                        <a:rPr lang="ja-JP" altLang="en-US"/>
-                        <a:t>安全でない</a:t>
-                      </a:r>
-                    </a:p>
-                  </a:txBody>
-                  <a:tcPr anchor="ctr"/>
-                </a:tc>
-                <a:extLst>
-                  <a:ext uri="{0D108BD9-81ED-4DB2-BD59-A6C34878D82A}">
-                    <a16:rowId xmlns:a16="http://schemas.microsoft.com/office/drawing/2014/main" val="2477349119"/>
-                  </a:ext>
-                </a:extLst>
-              </a:tr>
-              <a:tr h="370840">
-                <a:tc>
-                  <a:txBody>
-                    <a:bodyPr/>
-                    <a:lstStyle/>
-                    <a:p>
-                      <a:r>
-                        <a:rPr lang="en-US" altLang="ja-JP"/>
-                        <a:t>PKCS#1 v1.5</a:t>
-                      </a:r>
-                      <a:r>
-                        <a:rPr lang="ja-JP" altLang="en-US"/>
-                        <a:t>で定義されたもの</a:t>
-                      </a:r>
-                    </a:p>
-                  </a:txBody>
-                  <a:tcPr anchor="ctr"/>
-                </a:tc>
-                <a:tc>
-                  <a:txBody>
-                    <a:bodyPr/>
-                    <a:lstStyle/>
-                    <a:p>
-                      <a:r>
-                        <a:rPr lang="ja-JP" altLang="en-US"/>
-                        <a:t>理論的に安全とは示されていない</a:t>
-                      </a:r>
-                    </a:p>
-                  </a:txBody>
-                  <a:tcPr anchor="ctr"/>
-                </a:tc>
-                <a:extLst>
-                  <a:ext uri="{0D108BD9-81ED-4DB2-BD59-A6C34878D82A}">
-                    <a16:rowId xmlns:a16="http://schemas.microsoft.com/office/drawing/2014/main" val="2136677416"/>
-                  </a:ext>
-                </a:extLst>
-              </a:tr>
-              <a:tr h="370840">
-                <a:tc>
-                  <a:txBody>
-                    <a:bodyPr/>
-                    <a:lstStyle/>
-                    <a:p>
-                      <a:r>
-                        <a:rPr lang="en-US"/>
-                        <a:t>RSA-OAEP</a:t>
-                      </a:r>
-                    </a:p>
-                  </a:txBody>
-                  <a:tcPr anchor="ctr"/>
-                </a:tc>
-                <a:tc>
-                  <a:txBody>
-                    <a:bodyPr/>
-                    <a:lstStyle/>
-                    <a:p>
-                      <a:r>
-                        <a:rPr lang="ja-JP" altLang="en-US"/>
-                        <a:t>理論的に安全と示されている</a:t>
-                      </a:r>
-                    </a:p>
-                  </a:txBody>
-                  <a:tcPr anchor="ctr"/>
-                </a:tc>
-                <a:extLst>
-                  <a:ext uri="{0D108BD9-81ED-4DB2-BD59-A6C34878D82A}">
-                    <a16:rowId xmlns:a16="http://schemas.microsoft.com/office/drawing/2014/main" val="603693760"/>
-                  </a:ext>
-                </a:extLst>
-              </a:tr>
-            </a:tbl>
-          </a:graphicData>
-        </a:graphic>
-      </p:graphicFrame>
-    </p:spTree>
-    <p:extLst>
-      <p:ext uri="{BB962C8B-B14F-4D97-AF65-F5344CB8AC3E}">
-        <p14:creationId xmlns:p14="http://schemas.microsoft.com/office/powerpoint/2010/main" val="2934881512"/>
-      </p:ext>
-    </p:extLst>
-  </p:cSld>
-  <p:clrMapOvr>
-    <a:masterClrMapping/>
-  </p:clrMapOvr>
-</p:sld>
-</file>
-
-<file path=ppt/slides/slide25.xml><?xml version="1.0" encoding="utf-8"?>
-<p:sld xmlns:a="http://schemas.openxmlformats.org/drawingml/2006/main" xmlns:r="http://schemas.openxmlformats.org/officeDocument/2006/relationships" xmlns:p="http://schemas.openxmlformats.org/presentationml/2006/main">
-  <p:cSld>
-    <p:spTree>
-      <p:nvGrpSpPr>
-        <p:cNvPr id="1" name=""/>
-        <p:cNvGrpSpPr/>
-        <p:nvPr/>
-      </p:nvGrpSpPr>
-      <p:grpSpPr>
-        <a:xfrm>
-          <a:off x="0" y="0"/>
-          <a:ext cx="0" cy="0"/>
-          <a:chOff x="0" y="0"/>
-          <a:chExt cx="0" cy="0"/>
-        </a:xfrm>
-      </p:grpSpPr>
-      <p:sp>
-        <p:nvSpPr>
-          <p:cNvPr id="2" name="コンテンツ プレースホルダー 1">
-            <a:extLst>
-              <a:ext uri="{FF2B5EF4-FFF2-40B4-BE49-F238E27FC236}">
-                <a16:creationId xmlns:a16="http://schemas.microsoft.com/office/drawing/2014/main" id="{86146898-2571-45B8-BBE9-7768511FA4DD}"/>
-              </a:ext>
-            </a:extLst>
-          </p:cNvPr>
-          <p:cNvSpPr>
-            <a:spLocks noGrp="1"/>
-          </p:cNvSpPr>
-          <p:nvPr>
-            <p:ph idx="1"/>
-          </p:nvPr>
-        </p:nvSpPr>
-        <p:spPr/>
-        <p:txBody>
-          <a:bodyPr/>
-          <a:lstStyle/>
-          <a:p>
-            <a:r>
-              <a:rPr kumimoji="1" lang="ja-JP" altLang="en-US"/>
-              <a:t>鍵生成 </a:t>
-            </a:r>
-            <a:r>
-              <a:rPr kumimoji="1" lang="en-US" altLang="ja-JP"/>
-              <a:t>; </a:t>
-            </a:r>
-            <a:r>
-              <a:rPr kumimoji="1" lang="ja-JP" altLang="en-US"/>
-              <a:t>秘密鍵ファイルを作る</a:t>
-            </a:r>
-            <a:endParaRPr kumimoji="1" lang="en-US" altLang="ja-JP"/>
-          </a:p>
-          <a:p>
-            <a:endParaRPr lang="en-US" altLang="ja-JP"/>
-          </a:p>
-          <a:p>
-            <a:r>
-              <a:rPr kumimoji="1" lang="ja-JP" altLang="en-US"/>
-              <a:t>秘密鍵ファイルから公開鍵ファイルを取り出す</a:t>
-            </a:r>
-            <a:endParaRPr kumimoji="1" lang="en-US" altLang="ja-JP"/>
-          </a:p>
-          <a:p>
-            <a:pPr lvl="1"/>
-            <a:endParaRPr kumimoji="1" lang="en-US" altLang="ja-JP"/>
-          </a:p>
-          <a:p>
-            <a:pPr lvl="1"/>
-            <a:endParaRPr lang="en-US" altLang="ja-JP"/>
-          </a:p>
-          <a:p>
-            <a:r>
-              <a:rPr kumimoji="1" lang="ja-JP" altLang="en-US"/>
-              <a:t>ファイルの中身を見る</a:t>
-            </a:r>
-            <a:endParaRPr kumimoji="1" lang="en-US" altLang="ja-JP"/>
-          </a:p>
-          <a:p>
-            <a:endParaRPr lang="en-US" altLang="ja-JP"/>
-          </a:p>
-          <a:p>
-            <a:endParaRPr kumimoji="1" lang="en-US" altLang="ja-JP"/>
-          </a:p>
-          <a:p>
-            <a:r>
-              <a:rPr lang="en-US" altLang="ja-JP"/>
-              <a:t>Python</a:t>
-            </a:r>
-            <a:r>
-              <a:rPr lang="ja-JP" altLang="en-US"/>
-              <a:t>で</a:t>
-            </a:r>
-            <a:r>
-              <a:rPr lang="en-US" altLang="ja-JP"/>
-              <a:t>16</a:t>
-            </a:r>
-            <a:r>
-              <a:rPr lang="ja-JP" altLang="en-US"/>
-              <a:t>進数を設定する</a:t>
-            </a:r>
-            <a:endParaRPr lang="en-US" altLang="ja-JP"/>
-          </a:p>
-        </p:txBody>
-      </p:sp>
-      <p:sp>
-        <p:nvSpPr>
-          <p:cNvPr id="3" name="スライド番号プレースホルダー 2">
-            <a:extLst>
-              <a:ext uri="{FF2B5EF4-FFF2-40B4-BE49-F238E27FC236}">
-                <a16:creationId xmlns:a16="http://schemas.microsoft.com/office/drawing/2014/main" id="{7408791B-AB2A-4971-B915-10D7499DEEEB}"/>
-              </a:ext>
-            </a:extLst>
-          </p:cNvPr>
-          <p:cNvSpPr>
-            <a:spLocks noGrp="1"/>
-          </p:cNvSpPr>
-          <p:nvPr>
-            <p:ph type="sldNum" sz="quarter" idx="12"/>
-          </p:nvPr>
-        </p:nvSpPr>
-        <p:spPr/>
-        <p:txBody>
-          <a:bodyPr/>
-          <a:lstStyle/>
-          <a:p>
-            <a:pPr>
-              <a:defRPr/>
-            </a:pPr>
-            <a:r>
-              <a:rPr lang="en-US" altLang="ja-JP"/>
-              <a:t>    </a:t>
-            </a:r>
-            <a:fld id="{B2782DEB-472A-4FE5-AC34-C17109CF5A91}" type="slidenum">
-              <a:rPr lang="en-US" altLang="ja-JP" smtClean="0"/>
-              <a:pPr>
-                <a:defRPr/>
-              </a:pPr>
-              <a:t>25</a:t>
-            </a:fld>
-            <a:r>
-              <a:rPr lang="en-US" altLang="ja-JP"/>
-              <a:t> / 24</a:t>
-            </a:r>
-          </a:p>
-        </p:txBody>
-      </p:sp>
-      <p:sp>
-        <p:nvSpPr>
-          <p:cNvPr id="4" name="タイトル 3">
-            <a:extLst>
-              <a:ext uri="{FF2B5EF4-FFF2-40B4-BE49-F238E27FC236}">
-                <a16:creationId xmlns:a16="http://schemas.microsoft.com/office/drawing/2014/main" id="{7D145D0B-65D8-4D71-B09E-B95A4BD377C3}"/>
-              </a:ext>
-            </a:extLst>
-          </p:cNvPr>
-          <p:cNvSpPr>
-            <a:spLocks noGrp="1"/>
-          </p:cNvSpPr>
-          <p:nvPr>
-            <p:ph type="title"/>
-          </p:nvPr>
-        </p:nvSpPr>
-        <p:spPr/>
-        <p:txBody>
-          <a:bodyPr/>
-          <a:lstStyle/>
-          <a:p>
-            <a:r>
-              <a:rPr kumimoji="1" lang="en-US" altLang="ja-JP"/>
-              <a:t>OpenSSL</a:t>
-            </a:r>
-            <a:r>
-              <a:rPr kumimoji="1" lang="ja-JP" altLang="en-US"/>
-              <a:t>による</a:t>
-            </a:r>
-            <a:r>
-              <a:rPr kumimoji="1" lang="en-US" altLang="ja-JP"/>
-              <a:t>RSA</a:t>
-            </a:r>
-            <a:r>
-              <a:rPr kumimoji="1" lang="ja-JP" altLang="en-US"/>
-              <a:t>暗号の鍵の作り方</a:t>
-            </a:r>
-          </a:p>
-        </p:txBody>
-      </p:sp>
-      <p:sp>
-        <p:nvSpPr>
-          <p:cNvPr id="5" name="テキスト ボックス 4">
-            <a:extLst>
-              <a:ext uri="{FF2B5EF4-FFF2-40B4-BE49-F238E27FC236}">
-                <a16:creationId xmlns:a16="http://schemas.microsoft.com/office/drawing/2014/main" id="{4F4FBDEA-DA11-4B79-B39E-0693546B9E9C}"/>
-              </a:ext>
-            </a:extLst>
-          </p:cNvPr>
-          <p:cNvSpPr txBox="1"/>
-          <p:nvPr/>
-        </p:nvSpPr>
-        <p:spPr>
-          <a:xfrm>
-            <a:off x="179512" y="1268760"/>
-            <a:ext cx="8784976" cy="461665"/>
-          </a:xfrm>
-          <a:prstGeom prst="rect">
-            <a:avLst/>
-          </a:prstGeom>
-          <a:solidFill>
-            <a:schemeClr val="bg1">
-              <a:lumMod val="95000"/>
-            </a:schemeClr>
-          </a:solidFill>
-          <a:ln w="19050" cap="rnd">
-            <a:noFill/>
-          </a:ln>
-        </p:spPr>
-        <p:txBody>
-          <a:bodyPr wrap="square" rtlCol="0">
-            <a:spAutoFit/>
-          </a:bodyPr>
-          <a:lstStyle/>
-          <a:p>
-            <a:r>
-              <a:rPr kumimoji="1" lang="en-US" altLang="ja-JP" sz="2400">
-                <a:latin typeface="游ゴシック" panose="020B0400000000000000" pitchFamily="50" charset="-128"/>
-                <a:ea typeface="游ゴシック" panose="020B0400000000000000" pitchFamily="50" charset="-128"/>
-                <a:cs typeface="Courier New" pitchFamily="49" charset="0"/>
-              </a:rPr>
-              <a:t>openssl genrsa 2048 &gt; sec-test-key.txt</a:t>
-            </a:r>
-            <a:endParaRPr kumimoji="1" lang="ja-JP" altLang="en-US" sz="2400">
-              <a:latin typeface="游ゴシック" panose="020B0400000000000000" pitchFamily="50" charset="-128"/>
-              <a:ea typeface="游ゴシック" panose="020B0400000000000000" pitchFamily="50" charset="-128"/>
-              <a:cs typeface="Courier New" pitchFamily="49" charset="0"/>
-            </a:endParaRPr>
-          </a:p>
-        </p:txBody>
-      </p:sp>
-      <p:sp>
-        <p:nvSpPr>
-          <p:cNvPr id="10" name="テキスト ボックス 9">
-            <a:extLst>
-              <a:ext uri="{FF2B5EF4-FFF2-40B4-BE49-F238E27FC236}">
-                <a16:creationId xmlns:a16="http://schemas.microsoft.com/office/drawing/2014/main" id="{DFB8F365-4179-49A9-8B22-EAED2F90F987}"/>
-              </a:ext>
-            </a:extLst>
-          </p:cNvPr>
-          <p:cNvSpPr txBox="1"/>
-          <p:nvPr/>
-        </p:nvSpPr>
-        <p:spPr>
-          <a:xfrm>
-            <a:off x="179512" y="2564904"/>
-            <a:ext cx="8784976" cy="461665"/>
-          </a:xfrm>
-          <a:prstGeom prst="rect">
-            <a:avLst/>
-          </a:prstGeom>
-          <a:solidFill>
-            <a:schemeClr val="bg1">
-              <a:lumMod val="95000"/>
-            </a:schemeClr>
-          </a:solidFill>
-          <a:ln w="19050" cap="rnd">
-            <a:noFill/>
-          </a:ln>
-        </p:spPr>
-        <p:txBody>
-          <a:bodyPr wrap="square" rtlCol="0">
-            <a:spAutoFit/>
-          </a:bodyPr>
-          <a:lstStyle/>
-          <a:p>
-            <a:r>
-              <a:rPr kumimoji="1" lang="en-US" altLang="ja-JP" sz="2400">
-                <a:latin typeface="游ゴシック" panose="020B0400000000000000" pitchFamily="50" charset="-128"/>
-                <a:ea typeface="游ゴシック" panose="020B0400000000000000" pitchFamily="50" charset="-128"/>
-                <a:cs typeface="Courier New" pitchFamily="49" charset="0"/>
-              </a:rPr>
-              <a:t>openssl rsa -pubout &lt; sec-test-key.txt &gt; pub-test-key.txt</a:t>
-            </a:r>
-            <a:endParaRPr kumimoji="1" lang="ja-JP" altLang="en-US" sz="2400">
-              <a:latin typeface="游ゴシック" panose="020B0400000000000000" pitchFamily="50" charset="-128"/>
-              <a:ea typeface="游ゴシック" panose="020B0400000000000000" pitchFamily="50" charset="-128"/>
-              <a:cs typeface="Courier New" pitchFamily="49" charset="0"/>
-            </a:endParaRPr>
-          </a:p>
-        </p:txBody>
-      </p:sp>
-      <p:sp>
-        <p:nvSpPr>
-          <p:cNvPr id="11" name="テキスト ボックス 10">
-            <a:extLst>
-              <a:ext uri="{FF2B5EF4-FFF2-40B4-BE49-F238E27FC236}">
-                <a16:creationId xmlns:a16="http://schemas.microsoft.com/office/drawing/2014/main" id="{3465CE71-7D3F-45B0-9328-227DE79821DD}"/>
-              </a:ext>
-            </a:extLst>
-          </p:cNvPr>
-          <p:cNvSpPr txBox="1"/>
-          <p:nvPr/>
-        </p:nvSpPr>
-        <p:spPr>
-          <a:xfrm>
-            <a:off x="179512" y="3870555"/>
-            <a:ext cx="8784976" cy="830997"/>
-          </a:xfrm>
-          <a:prstGeom prst="rect">
-            <a:avLst/>
-          </a:prstGeom>
-          <a:solidFill>
-            <a:schemeClr val="bg1">
-              <a:lumMod val="95000"/>
-            </a:schemeClr>
-          </a:solidFill>
-          <a:ln w="19050" cap="rnd">
-            <a:noFill/>
-          </a:ln>
-        </p:spPr>
-        <p:txBody>
-          <a:bodyPr wrap="square" rtlCol="0">
-            <a:spAutoFit/>
-          </a:bodyPr>
-          <a:lstStyle/>
-          <a:p>
-            <a:r>
-              <a:rPr kumimoji="1" lang="en-US" altLang="ja-JP" sz="2400">
-                <a:latin typeface="游ゴシック" panose="020B0400000000000000" pitchFamily="50" charset="-128"/>
-                <a:ea typeface="游ゴシック" panose="020B0400000000000000" pitchFamily="50" charset="-128"/>
-                <a:cs typeface="Courier New" pitchFamily="49" charset="0"/>
-              </a:rPr>
-              <a:t>openssl rsa -text -pubin -noout &lt; pub-test-key.txt</a:t>
-            </a:r>
-          </a:p>
-          <a:p>
-            <a:r>
-              <a:rPr kumimoji="1" lang="en-US" altLang="ja-JP" sz="2400">
-                <a:latin typeface="游ゴシック" panose="020B0400000000000000" pitchFamily="50" charset="-128"/>
-                <a:ea typeface="游ゴシック" panose="020B0400000000000000" pitchFamily="50" charset="-128"/>
-                <a:cs typeface="Courier New" pitchFamily="49" charset="0"/>
-              </a:rPr>
-              <a:t>openssl rsa -text -noout &lt; sec-test-key.txt</a:t>
-            </a:r>
-            <a:endParaRPr kumimoji="1" lang="ja-JP" altLang="en-US" sz="2400">
-              <a:latin typeface="游ゴシック" panose="020B0400000000000000" pitchFamily="50" charset="-128"/>
-              <a:ea typeface="游ゴシック" panose="020B0400000000000000" pitchFamily="50" charset="-128"/>
-              <a:cs typeface="Courier New" pitchFamily="49" charset="0"/>
-            </a:endParaRPr>
-          </a:p>
-        </p:txBody>
-      </p:sp>
-      <p:sp>
-        <p:nvSpPr>
-          <p:cNvPr id="13" name="テキスト ボックス 12">
-            <a:extLst>
-              <a:ext uri="{FF2B5EF4-FFF2-40B4-BE49-F238E27FC236}">
-                <a16:creationId xmlns:a16="http://schemas.microsoft.com/office/drawing/2014/main" id="{70F0AB3E-F493-4040-9056-22B7897941B4}"/>
-              </a:ext>
-            </a:extLst>
-          </p:cNvPr>
-          <p:cNvSpPr txBox="1"/>
-          <p:nvPr/>
-        </p:nvSpPr>
-        <p:spPr>
-          <a:xfrm>
-            <a:off x="190732" y="5722203"/>
-            <a:ext cx="8784976" cy="830997"/>
-          </a:xfrm>
-          <a:prstGeom prst="rect">
-            <a:avLst/>
-          </a:prstGeom>
-          <a:solidFill>
-            <a:schemeClr val="bg1">
-              <a:lumMod val="95000"/>
-            </a:schemeClr>
-          </a:solidFill>
-          <a:ln w="19050" cap="rnd">
-            <a:noFill/>
-          </a:ln>
-        </p:spPr>
-        <p:txBody>
-          <a:bodyPr wrap="square" rtlCol="0">
-            <a:spAutoFit/>
-          </a:bodyPr>
-          <a:lstStyle/>
-          <a:p>
-            <a:r>
-              <a:rPr kumimoji="1" lang="en-US" altLang="ja-JP" sz="2400">
-                <a:latin typeface="游ゴシック" panose="020B0400000000000000" pitchFamily="50" charset="-128"/>
-                <a:ea typeface="游ゴシック" panose="020B0400000000000000" pitchFamily="50" charset="-128"/>
-                <a:cs typeface="Courier New" pitchFamily="49" charset="0"/>
-              </a:rPr>
-              <a:t>def convert_to_int(s):</a:t>
-            </a:r>
-          </a:p>
-          <a:p>
-            <a:r>
-              <a:rPr lang="en-US" altLang="ja-JP" sz="2400">
-                <a:latin typeface="游ゴシック" panose="020B0400000000000000" pitchFamily="50" charset="-128"/>
-                <a:ea typeface="游ゴシック" panose="020B0400000000000000" pitchFamily="50" charset="-128"/>
-                <a:cs typeface="Courier New" pitchFamily="49" charset="0"/>
-              </a:rPr>
-              <a:t>  </a:t>
-            </a:r>
-            <a:r>
-              <a:rPr kumimoji="1" lang="en-US" altLang="ja-JP" sz="2400">
-                <a:latin typeface="游ゴシック" panose="020B0400000000000000" pitchFamily="50" charset="-128"/>
-                <a:ea typeface="游ゴシック" panose="020B0400000000000000" pitchFamily="50" charset="-128"/>
-                <a:cs typeface="Courier New" pitchFamily="49" charset="0"/>
-              </a:rPr>
-              <a:t>return int("".join(s.split()).replace(":",""),16)</a:t>
-            </a:r>
-            <a:endParaRPr kumimoji="1" lang="ja-JP" altLang="en-US" sz="2400">
-              <a:latin typeface="游ゴシック" panose="020B0400000000000000" pitchFamily="50" charset="-128"/>
-              <a:ea typeface="游ゴシック" panose="020B0400000000000000" pitchFamily="50" charset="-128"/>
-              <a:cs typeface="Courier New" pitchFamily="49" charset="0"/>
-            </a:endParaRPr>
-          </a:p>
-        </p:txBody>
-      </p:sp>
-    </p:spTree>
-    <p:extLst>
-      <p:ext uri="{BB962C8B-B14F-4D97-AF65-F5344CB8AC3E}">
-        <p14:creationId xmlns:p14="http://schemas.microsoft.com/office/powerpoint/2010/main" val="1861223827"/>
-      </p:ext>
-    </p:extLst>
-  </p:cSld>
-  <p:clrMapOvr>
-    <a:masterClrMapping/>
-  </p:clrMapOvr>
-</p:sld>
-</file>
-
 <file path=ppt/slides/slide3.xml><?xml version="1.0" encoding="utf-8"?>
 <p:sld xmlns:a="http://schemas.openxmlformats.org/drawingml/2006/main" xmlns:r="http://schemas.openxmlformats.org/officeDocument/2006/relationships" xmlns:p="http://schemas.openxmlformats.org/presentationml/2006/main">
   <p:cSld>

</xml_diff>